<commit_message>
Partially resolving the UC Browser image update issue (try catch)
</commit_message>
<xml_diff>
--- a/www/static/nittio_res_v39/_icon_sources/icons.pptx
+++ b/www/static/nittio_res_v39/_icon_sources/icons.pptx
@@ -289,7 +289,7 @@
           <a:p>
             <a:fld id="{745A7134-949B-428F-9A82-7D09DE304FD2}" type="datetimeFigureOut">
               <a:rPr lang="en-IN" smtClean="0"/>
-              <a:t>26-10-2015</a:t>
+              <a:t>29-10-2015</a:t>
             </a:fld>
             <a:endParaRPr lang="en-IN"/>
           </a:p>
@@ -459,7 +459,7 @@
           <a:p>
             <a:fld id="{745A7134-949B-428F-9A82-7D09DE304FD2}" type="datetimeFigureOut">
               <a:rPr lang="en-IN" smtClean="0"/>
-              <a:t>26-10-2015</a:t>
+              <a:t>29-10-2015</a:t>
             </a:fld>
             <a:endParaRPr lang="en-IN"/>
           </a:p>
@@ -639,7 +639,7 @@
           <a:p>
             <a:fld id="{745A7134-949B-428F-9A82-7D09DE304FD2}" type="datetimeFigureOut">
               <a:rPr lang="en-IN" smtClean="0"/>
-              <a:t>26-10-2015</a:t>
+              <a:t>29-10-2015</a:t>
             </a:fld>
             <a:endParaRPr lang="en-IN"/>
           </a:p>
@@ -809,7 +809,7 @@
           <a:p>
             <a:fld id="{745A7134-949B-428F-9A82-7D09DE304FD2}" type="datetimeFigureOut">
               <a:rPr lang="en-IN" smtClean="0"/>
-              <a:t>26-10-2015</a:t>
+              <a:t>29-10-2015</a:t>
             </a:fld>
             <a:endParaRPr lang="en-IN"/>
           </a:p>
@@ -1055,7 +1055,7 @@
           <a:p>
             <a:fld id="{745A7134-949B-428F-9A82-7D09DE304FD2}" type="datetimeFigureOut">
               <a:rPr lang="en-IN" smtClean="0"/>
-              <a:t>26-10-2015</a:t>
+              <a:t>29-10-2015</a:t>
             </a:fld>
             <a:endParaRPr lang="en-IN"/>
           </a:p>
@@ -1343,7 +1343,7 @@
           <a:p>
             <a:fld id="{745A7134-949B-428F-9A82-7D09DE304FD2}" type="datetimeFigureOut">
               <a:rPr lang="en-IN" smtClean="0"/>
-              <a:t>26-10-2015</a:t>
+              <a:t>29-10-2015</a:t>
             </a:fld>
             <a:endParaRPr lang="en-IN"/>
           </a:p>
@@ -1765,7 +1765,7 @@
           <a:p>
             <a:fld id="{745A7134-949B-428F-9A82-7D09DE304FD2}" type="datetimeFigureOut">
               <a:rPr lang="en-IN" smtClean="0"/>
-              <a:t>26-10-2015</a:t>
+              <a:t>29-10-2015</a:t>
             </a:fld>
             <a:endParaRPr lang="en-IN"/>
           </a:p>
@@ -1883,7 +1883,7 @@
           <a:p>
             <a:fld id="{745A7134-949B-428F-9A82-7D09DE304FD2}" type="datetimeFigureOut">
               <a:rPr lang="en-IN" smtClean="0"/>
-              <a:t>26-10-2015</a:t>
+              <a:t>29-10-2015</a:t>
             </a:fld>
             <a:endParaRPr lang="en-IN"/>
           </a:p>
@@ -1978,7 +1978,7 @@
           <a:p>
             <a:fld id="{745A7134-949B-428F-9A82-7D09DE304FD2}" type="datetimeFigureOut">
               <a:rPr lang="en-IN" smtClean="0"/>
-              <a:t>26-10-2015</a:t>
+              <a:t>29-10-2015</a:t>
             </a:fld>
             <a:endParaRPr lang="en-IN"/>
           </a:p>
@@ -2255,7 +2255,7 @@
           <a:p>
             <a:fld id="{745A7134-949B-428F-9A82-7D09DE304FD2}" type="datetimeFigureOut">
               <a:rPr lang="en-IN" smtClean="0"/>
-              <a:t>26-10-2015</a:t>
+              <a:t>29-10-2015</a:t>
             </a:fld>
             <a:endParaRPr lang="en-IN"/>
           </a:p>
@@ -2508,7 +2508,7 @@
           <a:p>
             <a:fld id="{745A7134-949B-428F-9A82-7D09DE304FD2}" type="datetimeFigureOut">
               <a:rPr lang="en-IN" smtClean="0"/>
-              <a:t>26-10-2015</a:t>
+              <a:t>29-10-2015</a:t>
             </a:fld>
             <a:endParaRPr lang="en-IN"/>
           </a:p>
@@ -2721,7 +2721,7 @@
           <a:p>
             <a:fld id="{745A7134-949B-428F-9A82-7D09DE304FD2}" type="datetimeFigureOut">
               <a:rPr lang="en-IN" smtClean="0"/>
-              <a:t>26-10-2015</a:t>
+              <a:t>29-10-2015</a:t>
             </a:fld>
             <a:endParaRPr lang="en-IN"/>
           </a:p>
@@ -3678,16 +3678,61 @@
                 </a:solidFill>
                 <a:sym typeface="Wingdings"/>
               </a:rPr>
-              <a:t> Q ? ! &gt; &amp; $ # </a:t>
+              <a:t> Q ? ! &gt; &amp; $ # </a:t>
             </a:r>
             <a:r>
               <a:rPr lang="en-US" dirty="0" smtClean="0">
                 <a:solidFill>
                   <a:schemeClr val="tx1"/>
                 </a:solidFill>
+                <a:sym typeface="Wingdings"/>
+              </a:rPr>
+              <a:t></a:t>
+            </a:r>
+            <a:r>
+              <a:rPr lang="en-US" dirty="0" smtClean="0">
+                <a:solidFill>
+                  <a:schemeClr val="tx1"/>
+                </a:solidFill>
+                <a:sym typeface="Webdings"/>
+              </a:rPr>
+              <a:t></a:t>
+            </a:r>
+            <a:r>
+              <a:rPr lang="en-US" dirty="0" smtClean="0">
+                <a:solidFill>
+                  <a:schemeClr val="tx1"/>
+                </a:solidFill>
                 <a:sym typeface="MS Outlook"/>
               </a:rPr>
-              <a:t></a:t>
+              <a:t></a:t>
+            </a:r>
+            <a:r>
+              <a:rPr lang="en-US" dirty="0" smtClean="0">
+                <a:solidFill>
+                  <a:schemeClr val="tx1"/>
+                </a:solidFill>
+                <a:sym typeface="Webdings"/>
+              </a:rPr>
+              <a:t></a:t>
+            </a:r>
+            <a:r>
+              <a:rPr lang="en-US" dirty="0" smtClean="0">
+                <a:solidFill>
+                  <a:schemeClr val="tx1"/>
+                </a:solidFill>
+                <a:sym typeface="MS Outlook"/>
+              </a:rPr>
+              <a:t></a:t>
+            </a:r>
+            <a:r>
+              <a:rPr lang="en-US" dirty="0" smtClean="0">
+                <a:solidFill>
+                  <a:schemeClr val="tx1"/>
+                </a:solidFill>
+                <a:sym typeface="Wingdings"/>
+              </a:rPr>
+              <a:t></a:t>
             </a:r>
             <a:r>
               <a:rPr lang="en-US" dirty="0" smtClean="0">
@@ -4175,70 +4220,6 @@
           </a:p>
         </p:txBody>
       </p:sp>
-      <p:pic>
-        <p:nvPicPr>
-          <p:cNvPr id="164" name="Picture 7"/>
-          <p:cNvPicPr>
-            <a:picLocks noChangeAspect="1" noChangeArrowheads="1"/>
-          </p:cNvPicPr>
-          <p:nvPr/>
-        </p:nvPicPr>
-        <p:blipFill>
-          <a:blip r:embed="rId2">
-            <a:extLst>
-              <a:ext uri="{28A0092B-C50C-407E-A947-70E740481C1C}">
-                <a14:useLocalDpi xmlns:a14="http://schemas.microsoft.com/office/drawing/2010/main" val="0"/>
-              </a:ext>
-            </a:extLst>
-          </a:blip>
-          <a:srcRect/>
-          <a:stretch>
-            <a:fillRect/>
-          </a:stretch>
-        </p:blipFill>
-        <p:spPr bwMode="auto">
-          <a:xfrm>
-            <a:off x="129992" y="1678664"/>
-            <a:ext cx="487363" cy="92075"/>
-          </a:xfrm>
-          <a:prstGeom prst="rect">
-            <a:avLst/>
-          </a:prstGeom>
-          <a:noFill/>
-          <a:ln>
-            <a:noFill/>
-          </a:ln>
-          <a:effectLst/>
-          <a:extLst>
-            <a:ext uri="{909E8E84-426E-40DD-AFC4-6F175D3DCCD1}">
-              <a14:hiddenFill xmlns:a14="http://schemas.microsoft.com/office/drawing/2010/main">
-                <a:solidFill>
-                  <a:schemeClr val="accent1"/>
-                </a:solidFill>
-              </a14:hiddenFill>
-            </a:ext>
-            <a:ext uri="{91240B29-F687-4F45-9708-019B960494DF}">
-              <a14:hiddenLine xmlns:a14="http://schemas.microsoft.com/office/drawing/2010/main" w="9525">
-                <a:solidFill>
-                  <a:schemeClr val="tx1"/>
-                </a:solidFill>
-                <a:miter lim="800000"/>
-                <a:headEnd/>
-                <a:tailEnd/>
-              </a14:hiddenLine>
-            </a:ext>
-            <a:ext uri="{AF507438-7753-43E0-B8FC-AC1667EBCBE1}">
-              <a14:hiddenEffects xmlns:a14="http://schemas.microsoft.com/office/drawing/2010/main">
-                <a:effectLst>
-                  <a:outerShdw dist="35921" dir="2700000" algn="ctr" rotWithShape="0">
-                    <a:schemeClr val="bg2"/>
-                  </a:outerShdw>
-                </a:effectLst>
-              </a14:hiddenEffects>
-            </a:ext>
-          </a:extLst>
-        </p:spPr>
-      </p:pic>
       <p:sp>
         <p:nvSpPr>
           <p:cNvPr id="69" name="Rounded Rectangle 68"/>
@@ -6618,7 +6599,7 @@
           <p:nvPr/>
         </p:nvPicPr>
         <p:blipFill rotWithShape="1">
-          <a:blip r:embed="rId3">
+          <a:blip r:embed="rId2">
             <a:extLst>
               <a:ext uri="{28A0092B-C50C-407E-A947-70E740481C1C}">
                 <a14:useLocalDpi xmlns:a14="http://schemas.microsoft.com/office/drawing/2010/main" val="0"/>
@@ -6680,7 +6661,7 @@
           <p:nvPr/>
         </p:nvPicPr>
         <p:blipFill rotWithShape="1">
-          <a:blip r:embed="rId3">
+          <a:blip r:embed="rId2">
             <a:extLst>
               <a:ext uri="{28A0092B-C50C-407E-A947-70E740481C1C}">
                 <a14:useLocalDpi xmlns:a14="http://schemas.microsoft.com/office/drawing/2010/main" val="0"/>
@@ -6742,7 +6723,7 @@
           <p:nvPr/>
         </p:nvPicPr>
         <p:blipFill rotWithShape="1">
-          <a:blip r:embed="rId3">
+          <a:blip r:embed="rId2">
             <a:extLst>
               <a:ext uri="{28A0092B-C50C-407E-A947-70E740481C1C}">
                 <a14:useLocalDpi xmlns:a14="http://schemas.microsoft.com/office/drawing/2010/main" val="0"/>
@@ -7037,145 +7018,6 @@
       </p:grpSp>
       <p:grpSp>
         <p:nvGrpSpPr>
-          <p:cNvPr id="310" name="Group 309"/>
-          <p:cNvGrpSpPr/>
-          <p:nvPr/>
-        </p:nvGrpSpPr>
-        <p:grpSpPr>
-          <a:xfrm>
-            <a:off x="107504" y="1019116"/>
-            <a:ext cx="540000" cy="540000"/>
-            <a:chOff x="863648" y="2961008"/>
-            <a:chExt cx="540000" cy="540000"/>
-          </a:xfrm>
-        </p:grpSpPr>
-        <p:sp>
-          <p:nvSpPr>
-            <p:cNvPr id="311" name="Rounded Rectangle 310"/>
-            <p:cNvSpPr/>
-            <p:nvPr/>
-          </p:nvSpPr>
-          <p:spPr>
-            <a:xfrm>
-              <a:off x="863648" y="2961008"/>
-              <a:ext cx="540000" cy="540000"/>
-            </a:xfrm>
-            <a:prstGeom prst="roundRect">
-              <a:avLst/>
-            </a:prstGeom>
-            <a:solidFill>
-              <a:schemeClr val="accent6">
-                <a:lumMod val="50000"/>
-              </a:schemeClr>
-            </a:solidFill>
-            <a:ln>
-              <a:noFill/>
-            </a:ln>
-            <a:scene3d>
-              <a:camera prst="orthographicFront">
-                <a:rot lat="0" lon="0" rev="0"/>
-              </a:camera>
-              <a:lightRig rig="threePt" dir="t">
-                <a:rot lat="0" lon="0" rev="1200000"/>
-              </a:lightRig>
-            </a:scene3d>
-            <a:sp3d>
-              <a:bevelT w="63500" h="25400" prst="relaxedInset"/>
-            </a:sp3d>
-          </p:spPr>
-          <p:style>
-            <a:lnRef idx="0">
-              <a:schemeClr val="accent6"/>
-            </a:lnRef>
-            <a:fillRef idx="3">
-              <a:schemeClr val="accent6"/>
-            </a:fillRef>
-            <a:effectRef idx="3">
-              <a:schemeClr val="accent6"/>
-            </a:effectRef>
-            <a:fontRef idx="minor">
-              <a:schemeClr val="lt1"/>
-            </a:fontRef>
-          </p:style>
-          <p:txBody>
-            <a:bodyPr rtlCol="0" anchor="ctr"/>
-            <a:lstStyle/>
-            <a:p>
-              <a:pPr algn="ctr"/>
-              <a:endParaRPr lang="en-IN"/>
-            </a:p>
-          </p:txBody>
-        </p:sp>
-        <p:sp>
-          <p:nvSpPr>
-            <p:cNvPr id="312" name="Rounded Rectangle 311"/>
-            <p:cNvSpPr/>
-            <p:nvPr/>
-          </p:nvSpPr>
-          <p:spPr>
-            <a:xfrm>
-              <a:off x="917648" y="3015008"/>
-              <a:ext cx="432000" cy="432000"/>
-            </a:xfrm>
-            <a:prstGeom prst="roundRect">
-              <a:avLst/>
-            </a:prstGeom>
-            <a:gradFill flip="none" rotWithShape="1">
-              <a:gsLst>
-                <a:gs pos="0">
-                  <a:schemeClr val="bg1">
-                    <a:lumMod val="65000"/>
-                  </a:schemeClr>
-                </a:gs>
-                <a:gs pos="84000">
-                  <a:srgbClr val="FFD13F">
-                    <a:shade val="100000"/>
-                    <a:satMod val="115000"/>
-                  </a:srgbClr>
-                </a:gs>
-              </a:gsLst>
-              <a:lin ang="13500000" scaled="1"/>
-              <a:tileRect/>
-            </a:gradFill>
-            <a:ln>
-              <a:noFill/>
-            </a:ln>
-            <a:scene3d>
-              <a:camera prst="orthographicFront">
-                <a:rot lat="0" lon="0" rev="0"/>
-              </a:camera>
-              <a:lightRig rig="threePt" dir="t">
-                <a:rot lat="0" lon="0" rev="1200000"/>
-              </a:lightRig>
-            </a:scene3d>
-            <a:sp3d/>
-          </p:spPr>
-          <p:style>
-            <a:lnRef idx="0">
-              <a:schemeClr val="accent6"/>
-            </a:lnRef>
-            <a:fillRef idx="3">
-              <a:schemeClr val="accent6"/>
-            </a:fillRef>
-            <a:effectRef idx="3">
-              <a:schemeClr val="accent6"/>
-            </a:effectRef>
-            <a:fontRef idx="minor">
-              <a:schemeClr val="lt1"/>
-            </a:fontRef>
-          </p:style>
-          <p:txBody>
-            <a:bodyPr rtlCol="0" anchor="ctr"/>
-            <a:lstStyle/>
-            <a:p>
-              <a:pPr algn="ctr"/>
-              <a:endParaRPr lang="en-IN"/>
-            </a:p>
-          </p:txBody>
-        </p:sp>
-      </p:grpSp>
-      <p:grpSp>
-        <p:nvGrpSpPr>
           <p:cNvPr id="87" name="Group 86"/>
           <p:cNvGrpSpPr/>
           <p:nvPr/>
@@ -7570,7 +7412,7 @@
               <p:nvPr/>
             </p:nvPicPr>
             <p:blipFill rotWithShape="1">
-              <a:blip r:embed="rId4" cstate="print">
+              <a:blip r:embed="rId3" cstate="print">
                 <a:extLst>
                   <a:ext uri="{28A0092B-C50C-407E-A947-70E740481C1C}">
                     <a14:useLocalDpi xmlns:a14="http://schemas.microsoft.com/office/drawing/2010/main" val="0"/>
@@ -7632,7 +7474,7 @@
               <p:nvPr/>
             </p:nvPicPr>
             <p:blipFill rotWithShape="1">
-              <a:blip r:embed="rId4" cstate="print">
+              <a:blip r:embed="rId3" cstate="print">
                 <a:extLst>
                   <a:ext uri="{28A0092B-C50C-407E-A947-70E740481C1C}">
                     <a14:useLocalDpi xmlns:a14="http://schemas.microsoft.com/office/drawing/2010/main" val="0"/>
@@ -7694,7 +7536,7 @@
               <p:nvPr/>
             </p:nvPicPr>
             <p:blipFill rotWithShape="1">
-              <a:blip r:embed="rId4" cstate="print">
+              <a:blip r:embed="rId3" cstate="print">
                 <a:extLst>
                   <a:ext uri="{28A0092B-C50C-407E-A947-70E740481C1C}">
                     <a14:useLocalDpi xmlns:a14="http://schemas.microsoft.com/office/drawing/2010/main" val="0"/>
@@ -9084,6 +8926,382 @@
           </p:txBody>
         </p:sp>
       </p:grpSp>
+      <p:sp>
+        <p:nvSpPr>
+          <p:cNvPr id="108" name="Oval 107"/>
+          <p:cNvSpPr/>
+          <p:nvPr/>
+        </p:nvSpPr>
+        <p:spPr>
+          <a:xfrm>
+            <a:off x="5176749" y="2924944"/>
+            <a:ext cx="540000" cy="540000"/>
+          </a:xfrm>
+          <a:prstGeom prst="ellipse">
+            <a:avLst/>
+          </a:prstGeom>
+          <a:noFill/>
+          <a:ln/>
+          <a:scene3d>
+            <a:camera prst="isometricOffAxis1Right"/>
+            <a:lightRig rig="threePt" dir="t">
+              <a:rot lat="0" lon="0" rev="1200000"/>
+            </a:lightRig>
+          </a:scene3d>
+          <a:sp3d>
+            <a:bevelT w="63500" h="25400"/>
+          </a:sp3d>
+        </p:spPr>
+        <p:style>
+          <a:lnRef idx="0">
+            <a:schemeClr val="accent6"/>
+          </a:lnRef>
+          <a:fillRef idx="3">
+            <a:schemeClr val="accent6"/>
+          </a:fillRef>
+          <a:effectRef idx="3">
+            <a:schemeClr val="accent6"/>
+          </a:effectRef>
+          <a:fontRef idx="minor">
+            <a:schemeClr val="lt1"/>
+          </a:fontRef>
+        </p:style>
+        <p:txBody>
+          <a:bodyPr rtlCol="0" anchor="ctr">
+            <a:sp3d extrusionH="57150">
+              <a:bevelT w="38100" h="38100"/>
+            </a:sp3d>
+          </a:bodyPr>
+          <a:lstStyle/>
+          <a:p>
+            <a:pPr algn="ctr"/>
+            <a:r>
+              <a:rPr lang="en-US" sz="4400" b="1" dirty="0">
+                <a:ln>
+                  <a:solidFill>
+                    <a:schemeClr val="tx1"/>
+                  </a:solidFill>
+                </a:ln>
+                <a:solidFill>
+                  <a:srgbClr val="F2750F"/>
+                </a:solidFill>
+                <a:latin typeface="Cooper Black" panose="0208090404030B020404" pitchFamily="18" charset="0"/>
+                <a:sym typeface="Webdings"/>
+              </a:rPr>
+              <a:t></a:t>
+            </a:r>
+            <a:endParaRPr lang="en-IN" sz="4400" b="1" dirty="0">
+              <a:ln>
+                <a:solidFill>
+                  <a:schemeClr val="tx1"/>
+                </a:solidFill>
+              </a:ln>
+              <a:solidFill>
+                <a:srgbClr val="F2750F"/>
+              </a:solidFill>
+              <a:latin typeface="Cooper Black" panose="0208090404030B020404" pitchFamily="18" charset="0"/>
+            </a:endParaRPr>
+          </a:p>
+        </p:txBody>
+      </p:sp>
+      <p:grpSp>
+        <p:nvGrpSpPr>
+          <p:cNvPr id="114" name="Group 113"/>
+          <p:cNvGrpSpPr/>
+          <p:nvPr/>
+        </p:nvGrpSpPr>
+        <p:grpSpPr>
+          <a:xfrm>
+            <a:off x="259904" y="1171516"/>
+            <a:ext cx="540000" cy="540000"/>
+            <a:chOff x="863648" y="2961008"/>
+            <a:chExt cx="540000" cy="540000"/>
+          </a:xfrm>
+        </p:grpSpPr>
+        <p:sp>
+          <p:nvSpPr>
+            <p:cNvPr id="115" name="Rounded Rectangle 114"/>
+            <p:cNvSpPr/>
+            <p:nvPr/>
+          </p:nvSpPr>
+          <p:spPr>
+            <a:xfrm>
+              <a:off x="863648" y="2961008"/>
+              <a:ext cx="540000" cy="540000"/>
+            </a:xfrm>
+            <a:prstGeom prst="roundRect">
+              <a:avLst/>
+            </a:prstGeom>
+            <a:solidFill>
+              <a:schemeClr val="accent6">
+                <a:lumMod val="50000"/>
+              </a:schemeClr>
+            </a:solidFill>
+            <a:ln>
+              <a:noFill/>
+            </a:ln>
+            <a:scene3d>
+              <a:camera prst="orthographicFront">
+                <a:rot lat="0" lon="0" rev="0"/>
+              </a:camera>
+              <a:lightRig rig="threePt" dir="t">
+                <a:rot lat="0" lon="0" rev="1200000"/>
+              </a:lightRig>
+            </a:scene3d>
+            <a:sp3d>
+              <a:bevelT w="63500" h="25400" prst="relaxedInset"/>
+            </a:sp3d>
+          </p:spPr>
+          <p:style>
+            <a:lnRef idx="0">
+              <a:schemeClr val="accent6"/>
+            </a:lnRef>
+            <a:fillRef idx="3">
+              <a:schemeClr val="accent6"/>
+            </a:fillRef>
+            <a:effectRef idx="3">
+              <a:schemeClr val="accent6"/>
+            </a:effectRef>
+            <a:fontRef idx="minor">
+              <a:schemeClr val="lt1"/>
+            </a:fontRef>
+          </p:style>
+          <p:txBody>
+            <a:bodyPr rtlCol="0" anchor="ctr"/>
+            <a:lstStyle/>
+            <a:p>
+              <a:pPr algn="ctr"/>
+              <a:endParaRPr lang="en-IN"/>
+            </a:p>
+          </p:txBody>
+        </p:sp>
+        <p:sp>
+          <p:nvSpPr>
+            <p:cNvPr id="116" name="Rounded Rectangle 115"/>
+            <p:cNvSpPr/>
+            <p:nvPr/>
+          </p:nvSpPr>
+          <p:spPr>
+            <a:xfrm>
+              <a:off x="917648" y="3015008"/>
+              <a:ext cx="432000" cy="432000"/>
+            </a:xfrm>
+            <a:prstGeom prst="roundRect">
+              <a:avLst/>
+            </a:prstGeom>
+            <a:gradFill flip="none" rotWithShape="1">
+              <a:gsLst>
+                <a:gs pos="0">
+                  <a:schemeClr val="bg1">
+                    <a:lumMod val="65000"/>
+                  </a:schemeClr>
+                </a:gs>
+                <a:gs pos="84000">
+                  <a:srgbClr val="FFD13F">
+                    <a:shade val="100000"/>
+                    <a:satMod val="115000"/>
+                  </a:srgbClr>
+                </a:gs>
+              </a:gsLst>
+              <a:lin ang="13500000" scaled="1"/>
+              <a:tileRect/>
+            </a:gradFill>
+            <a:ln>
+              <a:noFill/>
+            </a:ln>
+            <a:scene3d>
+              <a:camera prst="orthographicFront">
+                <a:rot lat="0" lon="0" rev="0"/>
+              </a:camera>
+              <a:lightRig rig="threePt" dir="t">
+                <a:rot lat="0" lon="0" rev="1200000"/>
+              </a:lightRig>
+            </a:scene3d>
+            <a:sp3d/>
+          </p:spPr>
+          <p:style>
+            <a:lnRef idx="0">
+              <a:schemeClr val="accent6"/>
+            </a:lnRef>
+            <a:fillRef idx="3">
+              <a:schemeClr val="accent6"/>
+            </a:fillRef>
+            <a:effectRef idx="3">
+              <a:schemeClr val="accent6"/>
+            </a:effectRef>
+            <a:fontRef idx="minor">
+              <a:schemeClr val="lt1"/>
+            </a:fontRef>
+          </p:style>
+          <p:txBody>
+            <a:bodyPr rtlCol="0" anchor="ctr"/>
+            <a:lstStyle/>
+            <a:p>
+              <a:pPr algn="ctr"/>
+              <a:endParaRPr lang="en-IN"/>
+            </a:p>
+          </p:txBody>
+        </p:sp>
+      </p:grpSp>
+      <p:sp>
+        <p:nvSpPr>
+          <p:cNvPr id="133" name="Oval 132"/>
+          <p:cNvSpPr/>
+          <p:nvPr/>
+        </p:nvSpPr>
+        <p:spPr>
+          <a:xfrm>
+            <a:off x="6188087" y="2898943"/>
+            <a:ext cx="540000" cy="540000"/>
+          </a:xfrm>
+          <a:prstGeom prst="ellipse">
+            <a:avLst/>
+          </a:prstGeom>
+          <a:noFill/>
+          <a:ln/>
+          <a:scene3d>
+            <a:camera prst="orthographicFront"/>
+            <a:lightRig rig="threePt" dir="t">
+              <a:rot lat="0" lon="0" rev="1200000"/>
+            </a:lightRig>
+          </a:scene3d>
+          <a:sp3d>
+            <a:bevelT w="63500" h="25400"/>
+          </a:sp3d>
+        </p:spPr>
+        <p:style>
+          <a:lnRef idx="0">
+            <a:schemeClr val="accent6"/>
+          </a:lnRef>
+          <a:fillRef idx="3">
+            <a:schemeClr val="accent6"/>
+          </a:fillRef>
+          <a:effectRef idx="3">
+            <a:schemeClr val="accent6"/>
+          </a:effectRef>
+          <a:fontRef idx="minor">
+            <a:schemeClr val="lt1"/>
+          </a:fontRef>
+        </p:style>
+        <p:txBody>
+          <a:bodyPr rtlCol="0" anchor="ctr">
+            <a:sp3d extrusionH="57150">
+              <a:bevelT w="38100" h="38100"/>
+            </a:sp3d>
+          </a:bodyPr>
+          <a:lstStyle/>
+          <a:p>
+            <a:pPr algn="ctr"/>
+            <a:r>
+              <a:rPr lang="en-US" sz="4400" b="1" dirty="0">
+                <a:ln>
+                  <a:solidFill>
+                    <a:schemeClr val="tx1"/>
+                  </a:solidFill>
+                </a:ln>
+                <a:solidFill>
+                  <a:srgbClr val="F2750F"/>
+                </a:solidFill>
+                <a:latin typeface="Cooper Black" panose="0208090404030B020404" pitchFamily="18" charset="0"/>
+                <a:sym typeface="Webdings"/>
+              </a:rPr>
+              <a:t></a:t>
+            </a:r>
+            <a:endParaRPr lang="en-IN" sz="4400" b="1" dirty="0">
+              <a:ln>
+                <a:solidFill>
+                  <a:schemeClr val="tx1"/>
+                </a:solidFill>
+              </a:ln>
+              <a:solidFill>
+                <a:srgbClr val="F2750F"/>
+              </a:solidFill>
+              <a:latin typeface="Cooper Black" panose="0208090404030B020404" pitchFamily="18" charset="0"/>
+            </a:endParaRPr>
+          </a:p>
+        </p:txBody>
+      </p:sp>
+      <p:sp>
+        <p:nvSpPr>
+          <p:cNvPr id="134" name="Oval 133"/>
+          <p:cNvSpPr/>
+          <p:nvPr/>
+        </p:nvSpPr>
+        <p:spPr>
+          <a:xfrm>
+            <a:off x="7619270" y="1825028"/>
+            <a:ext cx="540000" cy="540000"/>
+          </a:xfrm>
+          <a:prstGeom prst="ellipse">
+            <a:avLst/>
+          </a:prstGeom>
+          <a:noFill/>
+          <a:ln/>
+          <a:scene3d>
+            <a:camera prst="perspectiveAbove"/>
+            <a:lightRig rig="threePt" dir="t">
+              <a:rot lat="0" lon="0" rev="1200000"/>
+            </a:lightRig>
+          </a:scene3d>
+          <a:sp3d>
+            <a:bevelT w="63500" h="25400"/>
+          </a:sp3d>
+        </p:spPr>
+        <p:style>
+          <a:lnRef idx="0">
+            <a:schemeClr val="accent6"/>
+          </a:lnRef>
+          <a:fillRef idx="3">
+            <a:schemeClr val="accent6"/>
+          </a:fillRef>
+          <a:effectRef idx="3">
+            <a:schemeClr val="accent6"/>
+          </a:effectRef>
+          <a:fontRef idx="minor">
+            <a:schemeClr val="lt1"/>
+          </a:fontRef>
+        </p:style>
+        <p:txBody>
+          <a:bodyPr rtlCol="0" anchor="ctr">
+            <a:sp3d extrusionH="57150">
+              <a:bevelT w="38100" h="38100"/>
+            </a:sp3d>
+          </a:bodyPr>
+          <a:lstStyle/>
+          <a:p>
+            <a:pPr algn="ctr"/>
+            <a:r>
+              <a:rPr lang="en-US" sz="5400" dirty="0">
+                <a:ln>
+                  <a:solidFill>
+                    <a:schemeClr val="tx1"/>
+                  </a:solidFill>
+                </a:ln>
+                <a:solidFill>
+                  <a:schemeClr val="bg1">
+                    <a:lumMod val="50000"/>
+                  </a:schemeClr>
+                </a:solidFill>
+                <a:sym typeface="Webdings"/>
+              </a:rPr>
+              <a:t></a:t>
+            </a:r>
+            <a:endParaRPr lang="en-IN" sz="5400" b="1" dirty="0">
+              <a:ln>
+                <a:solidFill>
+                  <a:schemeClr val="tx1"/>
+                </a:solidFill>
+              </a:ln>
+              <a:solidFill>
+                <a:schemeClr val="bg1">
+                  <a:lumMod val="50000"/>
+                </a:schemeClr>
+              </a:solidFill>
+              <a:latin typeface="Cooper Black" panose="0208090404030B020404" pitchFamily="18" charset="0"/>
+            </a:endParaRPr>
+          </a:p>
+        </p:txBody>
+      </p:sp>
     </p:spTree>
     <p:extLst>
       <p:ext uri="{BB962C8B-B14F-4D97-AF65-F5344CB8AC3E}">
@@ -9776,6 +9994,2645 @@
           </p:txBody>
         </p:sp>
       </p:grpSp>
+      <p:grpSp>
+        <p:nvGrpSpPr>
+          <p:cNvPr id="9" name="Group 8"/>
+          <p:cNvGrpSpPr/>
+          <p:nvPr/>
+        </p:nvGrpSpPr>
+        <p:grpSpPr>
+          <a:xfrm>
+            <a:off x="2843808" y="872716"/>
+            <a:ext cx="1177913" cy="1180916"/>
+            <a:chOff x="7498543" y="1531708"/>
+            <a:chExt cx="1177913" cy="1180916"/>
+          </a:xfrm>
+        </p:grpSpPr>
+        <p:grpSp>
+          <p:nvGrpSpPr>
+            <p:cNvPr id="10" name="Group 9"/>
+            <p:cNvGrpSpPr/>
+            <p:nvPr/>
+          </p:nvGrpSpPr>
+          <p:grpSpPr>
+            <a:xfrm>
+              <a:off x="7498543" y="1531708"/>
+              <a:ext cx="747607" cy="975812"/>
+              <a:chOff x="7498543" y="1531708"/>
+              <a:chExt cx="747607" cy="975812"/>
+            </a:xfrm>
+            <a:scene3d>
+              <a:camera prst="isometricOffAxis1Right"/>
+              <a:lightRig rig="threePt" dir="t"/>
+            </a:scene3d>
+          </p:grpSpPr>
+          <p:sp>
+            <p:nvSpPr>
+              <p:cNvPr id="17" name="Rounded Rectangle 16"/>
+              <p:cNvSpPr/>
+              <p:nvPr/>
+            </p:nvSpPr>
+            <p:spPr>
+              <a:xfrm>
+                <a:off x="7498543" y="1531708"/>
+                <a:ext cx="747607" cy="975812"/>
+              </a:xfrm>
+              <a:prstGeom prst="roundRect">
+                <a:avLst/>
+              </a:prstGeom>
+              <a:solidFill>
+                <a:schemeClr val="accent6">
+                  <a:lumMod val="50000"/>
+                </a:schemeClr>
+              </a:solidFill>
+              <a:ln>
+                <a:noFill/>
+              </a:ln>
+              <a:sp3d>
+                <a:bevelT w="63500" h="25400" prst="relaxedInset"/>
+              </a:sp3d>
+            </p:spPr>
+            <p:style>
+              <a:lnRef idx="0">
+                <a:schemeClr val="accent6"/>
+              </a:lnRef>
+              <a:fillRef idx="3">
+                <a:schemeClr val="accent6"/>
+              </a:fillRef>
+              <a:effectRef idx="3">
+                <a:schemeClr val="accent6"/>
+              </a:effectRef>
+              <a:fontRef idx="minor">
+                <a:schemeClr val="lt1"/>
+              </a:fontRef>
+            </p:style>
+            <p:txBody>
+              <a:bodyPr rtlCol="0" anchor="ctr"/>
+              <a:lstStyle/>
+              <a:p>
+                <a:pPr algn="ctr"/>
+                <a:endParaRPr lang="en-IN" sz="1200" b="1"/>
+              </a:p>
+            </p:txBody>
+          </p:sp>
+          <p:sp>
+            <p:nvSpPr>
+              <p:cNvPr id="18" name="Rounded Rectangle 17"/>
+              <p:cNvSpPr/>
+              <p:nvPr/>
+            </p:nvSpPr>
+            <p:spPr>
+              <a:xfrm>
+                <a:off x="7567843" y="1594784"/>
+                <a:ext cx="606422" cy="851757"/>
+              </a:xfrm>
+              <a:prstGeom prst="roundRect">
+                <a:avLst/>
+              </a:prstGeom>
+              <a:solidFill>
+                <a:schemeClr val="bg1"/>
+              </a:solidFill>
+              <a:ln>
+                <a:noFill/>
+              </a:ln>
+              <a:sp3d/>
+            </p:spPr>
+            <p:style>
+              <a:lnRef idx="0">
+                <a:schemeClr val="accent6"/>
+              </a:lnRef>
+              <a:fillRef idx="3">
+                <a:schemeClr val="accent6"/>
+              </a:fillRef>
+              <a:effectRef idx="3">
+                <a:schemeClr val="accent6"/>
+              </a:effectRef>
+              <a:fontRef idx="minor">
+                <a:schemeClr val="lt1"/>
+              </a:fontRef>
+            </p:style>
+            <p:txBody>
+              <a:bodyPr rtlCol="0" anchor="ctr"/>
+              <a:lstStyle/>
+              <a:p>
+                <a:pPr marL="171450" indent="-171450">
+                  <a:buFontTx/>
+                  <a:buChar char="-"/>
+                </a:pPr>
+                <a:r>
+                  <a:rPr lang="en-US" sz="1200" b="1" dirty="0" smtClean="0">
+                    <a:solidFill>
+                      <a:schemeClr val="tx1"/>
+                    </a:solidFill>
+                  </a:rPr>
+                  <a:t>----</a:t>
+                </a:r>
+              </a:p>
+              <a:p>
+                <a:pPr marL="171450" indent="-171450">
+                  <a:buFontTx/>
+                  <a:buChar char="-"/>
+                </a:pPr>
+                <a:r>
+                  <a:rPr lang="en-US" sz="1200" b="1" dirty="0" smtClean="0">
+                    <a:solidFill>
+                      <a:schemeClr val="tx1"/>
+                    </a:solidFill>
+                  </a:rPr>
+                  <a:t>----</a:t>
+                </a:r>
+              </a:p>
+              <a:p>
+                <a:pPr marL="171450" indent="-171450">
+                  <a:buFontTx/>
+                  <a:buChar char="-"/>
+                </a:pPr>
+                <a:r>
+                  <a:rPr lang="en-US" sz="1200" b="1" dirty="0" smtClean="0">
+                    <a:solidFill>
+                      <a:schemeClr val="tx1"/>
+                    </a:solidFill>
+                  </a:rPr>
+                  <a:t>----</a:t>
+                </a:r>
+              </a:p>
+              <a:p>
+                <a:endParaRPr lang="en-US" sz="1200" b="1" dirty="0">
+                  <a:solidFill>
+                    <a:schemeClr val="tx1"/>
+                  </a:solidFill>
+                </a:endParaRPr>
+              </a:p>
+            </p:txBody>
+          </p:sp>
+        </p:grpSp>
+        <p:grpSp>
+          <p:nvGrpSpPr>
+            <p:cNvPr id="11" name="Group 10"/>
+            <p:cNvGrpSpPr/>
+            <p:nvPr/>
+          </p:nvGrpSpPr>
+          <p:grpSpPr>
+            <a:xfrm>
+              <a:off x="7713696" y="1634260"/>
+              <a:ext cx="747607" cy="975812"/>
+              <a:chOff x="7498543" y="1531708"/>
+              <a:chExt cx="747607" cy="975812"/>
+            </a:xfrm>
+            <a:scene3d>
+              <a:camera prst="isometricOffAxis1Right"/>
+              <a:lightRig rig="threePt" dir="t"/>
+            </a:scene3d>
+          </p:grpSpPr>
+          <p:sp>
+            <p:nvSpPr>
+              <p:cNvPr id="15" name="Rounded Rectangle 14"/>
+              <p:cNvSpPr/>
+              <p:nvPr/>
+            </p:nvSpPr>
+            <p:spPr>
+              <a:xfrm>
+                <a:off x="7498543" y="1531708"/>
+                <a:ext cx="747607" cy="975812"/>
+              </a:xfrm>
+              <a:prstGeom prst="roundRect">
+                <a:avLst/>
+              </a:prstGeom>
+              <a:solidFill>
+                <a:schemeClr val="accent6">
+                  <a:lumMod val="50000"/>
+                </a:schemeClr>
+              </a:solidFill>
+              <a:ln>
+                <a:noFill/>
+              </a:ln>
+              <a:sp3d>
+                <a:bevelT w="63500" h="25400" prst="relaxedInset"/>
+              </a:sp3d>
+            </p:spPr>
+            <p:style>
+              <a:lnRef idx="0">
+                <a:schemeClr val="accent6"/>
+              </a:lnRef>
+              <a:fillRef idx="3">
+                <a:schemeClr val="accent6"/>
+              </a:fillRef>
+              <a:effectRef idx="3">
+                <a:schemeClr val="accent6"/>
+              </a:effectRef>
+              <a:fontRef idx="minor">
+                <a:schemeClr val="lt1"/>
+              </a:fontRef>
+            </p:style>
+            <p:txBody>
+              <a:bodyPr rtlCol="0" anchor="ctr"/>
+              <a:lstStyle/>
+              <a:p>
+                <a:pPr algn="ctr"/>
+                <a:endParaRPr lang="en-IN" sz="1200" b="1"/>
+              </a:p>
+            </p:txBody>
+          </p:sp>
+          <p:sp>
+            <p:nvSpPr>
+              <p:cNvPr id="16" name="Rounded Rectangle 15"/>
+              <p:cNvSpPr/>
+              <p:nvPr/>
+            </p:nvSpPr>
+            <p:spPr>
+              <a:xfrm>
+                <a:off x="7567843" y="1594784"/>
+                <a:ext cx="606422" cy="851757"/>
+              </a:xfrm>
+              <a:prstGeom prst="roundRect">
+                <a:avLst/>
+              </a:prstGeom>
+              <a:solidFill>
+                <a:schemeClr val="bg1"/>
+              </a:solidFill>
+              <a:ln>
+                <a:noFill/>
+              </a:ln>
+              <a:sp3d/>
+            </p:spPr>
+            <p:style>
+              <a:lnRef idx="0">
+                <a:schemeClr val="accent6"/>
+              </a:lnRef>
+              <a:fillRef idx="3">
+                <a:schemeClr val="accent6"/>
+              </a:fillRef>
+              <a:effectRef idx="3">
+                <a:schemeClr val="accent6"/>
+              </a:effectRef>
+              <a:fontRef idx="minor">
+                <a:schemeClr val="lt1"/>
+              </a:fontRef>
+            </p:style>
+            <p:txBody>
+              <a:bodyPr rtlCol="0" anchor="ctr"/>
+              <a:lstStyle/>
+              <a:p>
+                <a:pPr marL="171450" indent="-171450">
+                  <a:buFontTx/>
+                  <a:buChar char="-"/>
+                </a:pPr>
+                <a:r>
+                  <a:rPr lang="en-US" sz="1200" b="1" dirty="0" smtClean="0">
+                    <a:solidFill>
+                      <a:schemeClr val="tx1"/>
+                    </a:solidFill>
+                  </a:rPr>
+                  <a:t>----</a:t>
+                </a:r>
+              </a:p>
+              <a:p>
+                <a:pPr marL="171450" indent="-171450">
+                  <a:buFontTx/>
+                  <a:buChar char="-"/>
+                </a:pPr>
+                <a:r>
+                  <a:rPr lang="en-US" sz="1200" b="1" dirty="0" smtClean="0">
+                    <a:solidFill>
+                      <a:schemeClr val="tx1"/>
+                    </a:solidFill>
+                  </a:rPr>
+                  <a:t>----</a:t>
+                </a:r>
+              </a:p>
+              <a:p>
+                <a:pPr marL="171450" indent="-171450">
+                  <a:buFontTx/>
+                  <a:buChar char="-"/>
+                </a:pPr>
+                <a:r>
+                  <a:rPr lang="en-US" sz="1200" b="1" dirty="0" smtClean="0">
+                    <a:solidFill>
+                      <a:schemeClr val="tx1"/>
+                    </a:solidFill>
+                  </a:rPr>
+                  <a:t>----</a:t>
+                </a:r>
+              </a:p>
+              <a:p>
+                <a:endParaRPr lang="en-US" sz="1200" b="1" dirty="0">
+                  <a:solidFill>
+                    <a:schemeClr val="tx1"/>
+                  </a:solidFill>
+                </a:endParaRPr>
+              </a:p>
+            </p:txBody>
+          </p:sp>
+        </p:grpSp>
+        <p:grpSp>
+          <p:nvGrpSpPr>
+            <p:cNvPr id="12" name="Group 11"/>
+            <p:cNvGrpSpPr/>
+            <p:nvPr/>
+          </p:nvGrpSpPr>
+          <p:grpSpPr>
+            <a:xfrm>
+              <a:off x="7928849" y="1736812"/>
+              <a:ext cx="747607" cy="975812"/>
+              <a:chOff x="7498543" y="1531708"/>
+              <a:chExt cx="747607" cy="975812"/>
+            </a:xfrm>
+            <a:scene3d>
+              <a:camera prst="isometricOffAxis1Right"/>
+              <a:lightRig rig="threePt" dir="t"/>
+            </a:scene3d>
+          </p:grpSpPr>
+          <p:sp>
+            <p:nvSpPr>
+              <p:cNvPr id="13" name="Rounded Rectangle 12"/>
+              <p:cNvSpPr/>
+              <p:nvPr/>
+            </p:nvSpPr>
+            <p:spPr>
+              <a:xfrm>
+                <a:off x="7498543" y="1531708"/>
+                <a:ext cx="747607" cy="975812"/>
+              </a:xfrm>
+              <a:prstGeom prst="roundRect">
+                <a:avLst/>
+              </a:prstGeom>
+              <a:solidFill>
+                <a:schemeClr val="accent6">
+                  <a:lumMod val="50000"/>
+                </a:schemeClr>
+              </a:solidFill>
+              <a:ln>
+                <a:noFill/>
+              </a:ln>
+              <a:sp3d>
+                <a:bevelT w="63500" h="25400" prst="relaxedInset"/>
+              </a:sp3d>
+            </p:spPr>
+            <p:style>
+              <a:lnRef idx="0">
+                <a:schemeClr val="accent6"/>
+              </a:lnRef>
+              <a:fillRef idx="3">
+                <a:schemeClr val="accent6"/>
+              </a:fillRef>
+              <a:effectRef idx="3">
+                <a:schemeClr val="accent6"/>
+              </a:effectRef>
+              <a:fontRef idx="minor">
+                <a:schemeClr val="lt1"/>
+              </a:fontRef>
+            </p:style>
+            <p:txBody>
+              <a:bodyPr rtlCol="0" anchor="ctr"/>
+              <a:lstStyle/>
+              <a:p>
+                <a:pPr algn="ctr"/>
+                <a:endParaRPr lang="en-IN" sz="1200" b="1"/>
+              </a:p>
+            </p:txBody>
+          </p:sp>
+          <p:sp>
+            <p:nvSpPr>
+              <p:cNvPr id="14" name="Rounded Rectangle 13"/>
+              <p:cNvSpPr/>
+              <p:nvPr/>
+            </p:nvSpPr>
+            <p:spPr>
+              <a:xfrm>
+                <a:off x="7567843" y="1594784"/>
+                <a:ext cx="606422" cy="851757"/>
+              </a:xfrm>
+              <a:prstGeom prst="roundRect">
+                <a:avLst/>
+              </a:prstGeom>
+              <a:solidFill>
+                <a:schemeClr val="bg1"/>
+              </a:solidFill>
+              <a:ln>
+                <a:noFill/>
+              </a:ln>
+              <a:sp3d/>
+            </p:spPr>
+            <p:style>
+              <a:lnRef idx="0">
+                <a:schemeClr val="accent6"/>
+              </a:lnRef>
+              <a:fillRef idx="3">
+                <a:schemeClr val="accent6"/>
+              </a:fillRef>
+              <a:effectRef idx="3">
+                <a:schemeClr val="accent6"/>
+              </a:effectRef>
+              <a:fontRef idx="minor">
+                <a:schemeClr val="lt1"/>
+              </a:fontRef>
+            </p:style>
+            <p:txBody>
+              <a:bodyPr rtlCol="0" anchor="ctr"/>
+              <a:lstStyle/>
+              <a:p>
+                <a:pPr marL="171450" indent="-171450">
+                  <a:buFontTx/>
+                  <a:buChar char="-"/>
+                </a:pPr>
+                <a:r>
+                  <a:rPr lang="en-US" sz="1200" b="1" dirty="0" smtClean="0">
+                    <a:solidFill>
+                      <a:schemeClr val="tx1"/>
+                    </a:solidFill>
+                  </a:rPr>
+                  <a:t>----</a:t>
+                </a:r>
+              </a:p>
+              <a:p>
+                <a:pPr marL="171450" indent="-171450">
+                  <a:buFontTx/>
+                  <a:buChar char="-"/>
+                </a:pPr>
+                <a:r>
+                  <a:rPr lang="en-US" sz="1200" b="1" dirty="0" smtClean="0">
+                    <a:solidFill>
+                      <a:schemeClr val="tx1"/>
+                    </a:solidFill>
+                  </a:rPr>
+                  <a:t>----</a:t>
+                </a:r>
+              </a:p>
+              <a:p>
+                <a:pPr marL="171450" indent="-171450">
+                  <a:buFontTx/>
+                  <a:buChar char="-"/>
+                </a:pPr>
+                <a:r>
+                  <a:rPr lang="en-US" sz="1200" b="1" dirty="0" smtClean="0">
+                    <a:solidFill>
+                      <a:schemeClr val="tx1"/>
+                    </a:solidFill>
+                  </a:rPr>
+                  <a:t>----</a:t>
+                </a:r>
+              </a:p>
+              <a:p>
+                <a:endParaRPr lang="en-US" sz="1200" b="1" dirty="0">
+                  <a:solidFill>
+                    <a:schemeClr val="tx1"/>
+                  </a:solidFill>
+                </a:endParaRPr>
+              </a:p>
+            </p:txBody>
+          </p:sp>
+        </p:grpSp>
+      </p:grpSp>
+      <p:grpSp>
+        <p:nvGrpSpPr>
+          <p:cNvPr id="36" name="Group 35"/>
+          <p:cNvGrpSpPr/>
+          <p:nvPr/>
+        </p:nvGrpSpPr>
+        <p:grpSpPr>
+          <a:xfrm>
+            <a:off x="4554841" y="783456"/>
+            <a:ext cx="773243" cy="1109702"/>
+            <a:chOff x="4554841" y="783456"/>
+            <a:chExt cx="773243" cy="1109702"/>
+          </a:xfrm>
+          <a:scene3d>
+            <a:camera prst="perspectiveRelaxedModerately"/>
+            <a:lightRig rig="threePt" dir="t"/>
+          </a:scene3d>
+        </p:grpSpPr>
+        <p:sp>
+          <p:nvSpPr>
+            <p:cNvPr id="27" name="Rounded Rectangle 26"/>
+            <p:cNvSpPr/>
+            <p:nvPr/>
+          </p:nvSpPr>
+          <p:spPr>
+            <a:xfrm>
+              <a:off x="4554841" y="917346"/>
+              <a:ext cx="747607" cy="975812"/>
+            </a:xfrm>
+            <a:prstGeom prst="roundRect">
+              <a:avLst/>
+            </a:prstGeom>
+            <a:solidFill>
+              <a:schemeClr val="accent6">
+                <a:lumMod val="50000"/>
+              </a:schemeClr>
+            </a:solidFill>
+            <a:ln>
+              <a:noFill/>
+            </a:ln>
+            <a:sp3d>
+              <a:bevelT w="63500" h="25400" prst="relaxedInset"/>
+            </a:sp3d>
+          </p:spPr>
+          <p:style>
+            <a:lnRef idx="0">
+              <a:schemeClr val="accent6"/>
+            </a:lnRef>
+            <a:fillRef idx="3">
+              <a:schemeClr val="accent6"/>
+            </a:fillRef>
+            <a:effectRef idx="3">
+              <a:schemeClr val="accent6"/>
+            </a:effectRef>
+            <a:fontRef idx="minor">
+              <a:schemeClr val="lt1"/>
+            </a:fontRef>
+          </p:style>
+          <p:txBody>
+            <a:bodyPr rtlCol="0" anchor="ctr"/>
+            <a:lstStyle/>
+            <a:p>
+              <a:pPr algn="ctr"/>
+              <a:endParaRPr lang="en-IN" sz="1200" b="1"/>
+            </a:p>
+          </p:txBody>
+        </p:sp>
+        <p:sp>
+          <p:nvSpPr>
+            <p:cNvPr id="28" name="Rounded Rectangle 27"/>
+            <p:cNvSpPr/>
+            <p:nvPr/>
+          </p:nvSpPr>
+          <p:spPr>
+            <a:xfrm>
+              <a:off x="4608244" y="979374"/>
+              <a:ext cx="640800" cy="851757"/>
+            </a:xfrm>
+            <a:prstGeom prst="roundRect">
+              <a:avLst>
+                <a:gd name="adj" fmla="val 11282"/>
+              </a:avLst>
+            </a:prstGeom>
+            <a:solidFill>
+              <a:schemeClr val="bg1"/>
+            </a:solidFill>
+            <a:ln>
+              <a:noFill/>
+            </a:ln>
+            <a:sp3d/>
+          </p:spPr>
+          <p:style>
+            <a:lnRef idx="0">
+              <a:schemeClr val="accent6"/>
+            </a:lnRef>
+            <a:fillRef idx="3">
+              <a:schemeClr val="accent6"/>
+            </a:fillRef>
+            <a:effectRef idx="3">
+              <a:schemeClr val="accent6"/>
+            </a:effectRef>
+            <a:fontRef idx="minor">
+              <a:schemeClr val="lt1"/>
+            </a:fontRef>
+          </p:style>
+          <p:txBody>
+            <a:bodyPr rtlCol="0" anchor="ctr"/>
+            <a:lstStyle/>
+            <a:p>
+              <a:pPr marL="171450" indent="-171450">
+                <a:buFontTx/>
+                <a:buChar char="-"/>
+              </a:pPr>
+              <a:r>
+                <a:rPr lang="en-US" sz="1200" b="1" dirty="0" smtClean="0">
+                  <a:solidFill>
+                    <a:schemeClr val="tx1"/>
+                  </a:solidFill>
+                </a:rPr>
+                <a:t>----</a:t>
+              </a:r>
+            </a:p>
+            <a:p>
+              <a:pPr marL="171450" indent="-171450">
+                <a:buFontTx/>
+                <a:buChar char="-"/>
+              </a:pPr>
+              <a:r>
+                <a:rPr lang="en-US" sz="1200" b="1" dirty="0" smtClean="0">
+                  <a:solidFill>
+                    <a:schemeClr val="tx1"/>
+                  </a:solidFill>
+                </a:rPr>
+                <a:t>----</a:t>
+              </a:r>
+            </a:p>
+            <a:p>
+              <a:pPr marL="171450" indent="-171450">
+                <a:buFontTx/>
+                <a:buChar char="-"/>
+              </a:pPr>
+              <a:r>
+                <a:rPr lang="en-US" sz="1200" b="1" dirty="0" smtClean="0">
+                  <a:solidFill>
+                    <a:schemeClr val="tx1"/>
+                  </a:solidFill>
+                </a:rPr>
+                <a:t>----</a:t>
+              </a:r>
+            </a:p>
+            <a:p>
+              <a:pPr marL="171450" indent="-171450">
+                <a:buFontTx/>
+                <a:buChar char="-"/>
+              </a:pPr>
+              <a:r>
+                <a:rPr lang="en-US" sz="1200" b="1" dirty="0" smtClean="0">
+                  <a:solidFill>
+                    <a:schemeClr val="tx1"/>
+                  </a:solidFill>
+                </a:rPr>
+                <a:t>----</a:t>
+              </a:r>
+              <a:endParaRPr lang="en-US" sz="1200" b="1" dirty="0">
+                <a:solidFill>
+                  <a:schemeClr val="tx1"/>
+                </a:solidFill>
+              </a:endParaRPr>
+            </a:p>
+          </p:txBody>
+        </p:sp>
+        <p:sp>
+          <p:nvSpPr>
+            <p:cNvPr id="29" name="Oval 28"/>
+            <p:cNvSpPr/>
+            <p:nvPr/>
+          </p:nvSpPr>
+          <p:spPr>
+            <a:xfrm>
+              <a:off x="4788084" y="872716"/>
+              <a:ext cx="540000" cy="540000"/>
+            </a:xfrm>
+            <a:prstGeom prst="ellipse">
+              <a:avLst/>
+            </a:prstGeom>
+            <a:noFill/>
+            <a:ln/>
+            <a:sp3d>
+              <a:bevelT w="63500" h="25400"/>
+            </a:sp3d>
+          </p:spPr>
+          <p:style>
+            <a:lnRef idx="0">
+              <a:schemeClr val="accent6"/>
+            </a:lnRef>
+            <a:fillRef idx="3">
+              <a:schemeClr val="accent6"/>
+            </a:fillRef>
+            <a:effectRef idx="3">
+              <a:schemeClr val="accent6"/>
+            </a:effectRef>
+            <a:fontRef idx="minor">
+              <a:schemeClr val="lt1"/>
+            </a:fontRef>
+          </p:style>
+          <p:txBody>
+            <a:bodyPr rtlCol="0" anchor="ctr">
+              <a:sp3d extrusionH="57150">
+                <a:bevelT w="38100" h="38100"/>
+              </a:sp3d>
+            </a:bodyPr>
+            <a:lstStyle/>
+            <a:p>
+              <a:pPr algn="ctr"/>
+              <a:r>
+                <a:rPr lang="en-US" sz="2000" b="1" dirty="0">
+                  <a:ln>
+                    <a:solidFill>
+                      <a:srgbClr val="009600"/>
+                    </a:solidFill>
+                  </a:ln>
+                  <a:solidFill>
+                    <a:srgbClr val="009600"/>
+                  </a:solidFill>
+                  <a:latin typeface="Cooper Black" panose="0208090404030B020404" pitchFamily="18" charset="0"/>
+                  <a:sym typeface="Wingdings"/>
+                </a:rPr>
+                <a:t></a:t>
+              </a:r>
+              <a:endParaRPr lang="en-IN" sz="2000" b="1" dirty="0">
+                <a:ln>
+                  <a:solidFill>
+                    <a:srgbClr val="009600"/>
+                  </a:solidFill>
+                </a:ln>
+                <a:solidFill>
+                  <a:srgbClr val="009600"/>
+                </a:solidFill>
+                <a:latin typeface="Cooper Black" panose="0208090404030B020404" pitchFamily="18" charset="0"/>
+              </a:endParaRPr>
+            </a:p>
+          </p:txBody>
+        </p:sp>
+        <p:sp>
+          <p:nvSpPr>
+            <p:cNvPr id="30" name="Oval 29"/>
+            <p:cNvSpPr/>
+            <p:nvPr/>
+          </p:nvSpPr>
+          <p:spPr>
+            <a:xfrm>
+              <a:off x="4788024" y="1052796"/>
+              <a:ext cx="540000" cy="540000"/>
+            </a:xfrm>
+            <a:prstGeom prst="ellipse">
+              <a:avLst/>
+            </a:prstGeom>
+            <a:noFill/>
+            <a:ln/>
+            <a:sp3d>
+              <a:bevelT w="63500" h="25400"/>
+            </a:sp3d>
+          </p:spPr>
+          <p:style>
+            <a:lnRef idx="0">
+              <a:schemeClr val="accent6"/>
+            </a:lnRef>
+            <a:fillRef idx="3">
+              <a:schemeClr val="accent6"/>
+            </a:fillRef>
+            <a:effectRef idx="3">
+              <a:schemeClr val="accent6"/>
+            </a:effectRef>
+            <a:fontRef idx="minor">
+              <a:schemeClr val="lt1"/>
+            </a:fontRef>
+          </p:style>
+          <p:txBody>
+            <a:bodyPr rtlCol="0" anchor="ctr">
+              <a:sp3d extrusionH="57150">
+                <a:bevelT w="38100" h="38100"/>
+              </a:sp3d>
+            </a:bodyPr>
+            <a:lstStyle/>
+            <a:p>
+              <a:pPr algn="ctr"/>
+              <a:r>
+                <a:rPr lang="en-US" sz="2000" b="1" dirty="0">
+                  <a:ln>
+                    <a:solidFill>
+                      <a:srgbClr val="009600"/>
+                    </a:solidFill>
+                  </a:ln>
+                  <a:solidFill>
+                    <a:srgbClr val="009600"/>
+                  </a:solidFill>
+                  <a:latin typeface="Cooper Black" panose="0208090404030B020404" pitchFamily="18" charset="0"/>
+                  <a:sym typeface="Wingdings"/>
+                </a:rPr>
+                <a:t></a:t>
+              </a:r>
+              <a:endParaRPr lang="en-IN" sz="2000" b="1" dirty="0">
+                <a:ln>
+                  <a:solidFill>
+                    <a:srgbClr val="009600"/>
+                  </a:solidFill>
+                </a:ln>
+                <a:solidFill>
+                  <a:srgbClr val="009600"/>
+                </a:solidFill>
+                <a:latin typeface="Cooper Black" panose="0208090404030B020404" pitchFamily="18" charset="0"/>
+              </a:endParaRPr>
+            </a:p>
+          </p:txBody>
+        </p:sp>
+        <p:sp>
+          <p:nvSpPr>
+            <p:cNvPr id="31" name="Oval 30"/>
+            <p:cNvSpPr/>
+            <p:nvPr/>
+          </p:nvSpPr>
+          <p:spPr>
+            <a:xfrm>
+              <a:off x="4788024" y="1232816"/>
+              <a:ext cx="540000" cy="540000"/>
+            </a:xfrm>
+            <a:prstGeom prst="ellipse">
+              <a:avLst/>
+            </a:prstGeom>
+            <a:noFill/>
+            <a:ln/>
+            <a:sp3d>
+              <a:bevelT w="63500" h="25400"/>
+            </a:sp3d>
+          </p:spPr>
+          <p:style>
+            <a:lnRef idx="0">
+              <a:schemeClr val="accent6"/>
+            </a:lnRef>
+            <a:fillRef idx="3">
+              <a:schemeClr val="accent6"/>
+            </a:fillRef>
+            <a:effectRef idx="3">
+              <a:schemeClr val="accent6"/>
+            </a:effectRef>
+            <a:fontRef idx="minor">
+              <a:schemeClr val="lt1"/>
+            </a:fontRef>
+          </p:style>
+          <p:txBody>
+            <a:bodyPr rtlCol="0" anchor="ctr">
+              <a:sp3d extrusionH="57150">
+                <a:bevelT w="38100" h="38100"/>
+              </a:sp3d>
+            </a:bodyPr>
+            <a:lstStyle/>
+            <a:p>
+              <a:pPr algn="ctr"/>
+              <a:r>
+                <a:rPr lang="en-US" sz="2000" b="1" dirty="0">
+                  <a:ln>
+                    <a:solidFill>
+                      <a:srgbClr val="009600"/>
+                    </a:solidFill>
+                  </a:ln>
+                  <a:solidFill>
+                    <a:srgbClr val="009600"/>
+                  </a:solidFill>
+                  <a:latin typeface="Cooper Black" panose="0208090404030B020404" pitchFamily="18" charset="0"/>
+                  <a:sym typeface="Wingdings"/>
+                </a:rPr>
+                <a:t></a:t>
+              </a:r>
+              <a:endParaRPr lang="en-IN" sz="2000" b="1" dirty="0">
+                <a:ln>
+                  <a:solidFill>
+                    <a:srgbClr val="009600"/>
+                  </a:solidFill>
+                </a:ln>
+                <a:solidFill>
+                  <a:srgbClr val="009600"/>
+                </a:solidFill>
+                <a:latin typeface="Cooper Black" panose="0208090404030B020404" pitchFamily="18" charset="0"/>
+              </a:endParaRPr>
+            </a:p>
+          </p:txBody>
+        </p:sp>
+        <p:sp>
+          <p:nvSpPr>
+            <p:cNvPr id="33" name="Rectangle 32"/>
+            <p:cNvSpPr/>
+            <p:nvPr/>
+          </p:nvSpPr>
+          <p:spPr>
+            <a:xfrm>
+              <a:off x="4658614" y="891468"/>
+              <a:ext cx="540060" cy="102552"/>
+            </a:xfrm>
+            <a:prstGeom prst="rect">
+              <a:avLst/>
+            </a:prstGeom>
+            <a:solidFill>
+              <a:schemeClr val="bg1">
+                <a:lumMod val="50000"/>
+              </a:schemeClr>
+            </a:solidFill>
+            <a:ln>
+              <a:noFill/>
+            </a:ln>
+            <a:sp3d>
+              <a:bevelT w="63500" h="25400" prst="relaxedInset"/>
+            </a:sp3d>
+          </p:spPr>
+          <p:style>
+            <a:lnRef idx="0">
+              <a:schemeClr val="accent6"/>
+            </a:lnRef>
+            <a:fillRef idx="3">
+              <a:schemeClr val="accent6"/>
+            </a:fillRef>
+            <a:effectRef idx="3">
+              <a:schemeClr val="accent6"/>
+            </a:effectRef>
+            <a:fontRef idx="minor">
+              <a:schemeClr val="lt1"/>
+            </a:fontRef>
+          </p:style>
+          <p:txBody>
+            <a:bodyPr rtlCol="0" anchor="ctr"/>
+            <a:lstStyle/>
+            <a:p>
+              <a:pPr algn="ctr"/>
+              <a:endParaRPr lang="en-IN" sz="1200" b="1"/>
+            </a:p>
+          </p:txBody>
+        </p:sp>
+        <p:sp>
+          <p:nvSpPr>
+            <p:cNvPr id="32" name="Oval 31"/>
+            <p:cNvSpPr/>
+            <p:nvPr/>
+          </p:nvSpPr>
+          <p:spPr>
+            <a:xfrm>
+              <a:off x="4838634" y="783456"/>
+              <a:ext cx="180020" cy="153986"/>
+            </a:xfrm>
+            <a:prstGeom prst="ellipse">
+              <a:avLst/>
+            </a:prstGeom>
+            <a:solidFill>
+              <a:schemeClr val="bg1">
+                <a:lumMod val="50000"/>
+              </a:schemeClr>
+            </a:solidFill>
+            <a:ln>
+              <a:noFill/>
+            </a:ln>
+            <a:sp3d>
+              <a:bevelT w="63500" h="25400" prst="relaxedInset"/>
+            </a:sp3d>
+          </p:spPr>
+          <p:style>
+            <a:lnRef idx="0">
+              <a:schemeClr val="accent6"/>
+            </a:lnRef>
+            <a:fillRef idx="3">
+              <a:schemeClr val="accent6"/>
+            </a:fillRef>
+            <a:effectRef idx="3">
+              <a:schemeClr val="accent6"/>
+            </a:effectRef>
+            <a:fontRef idx="minor">
+              <a:schemeClr val="lt1"/>
+            </a:fontRef>
+          </p:style>
+          <p:txBody>
+            <a:bodyPr rtlCol="0" anchor="ctr"/>
+            <a:lstStyle/>
+            <a:p>
+              <a:pPr algn="ctr"/>
+              <a:endParaRPr lang="en-IN" sz="1200" b="1"/>
+            </a:p>
+          </p:txBody>
+        </p:sp>
+      </p:grpSp>
+      <p:grpSp>
+        <p:nvGrpSpPr>
+          <p:cNvPr id="74" name="Group 73"/>
+          <p:cNvGrpSpPr/>
+          <p:nvPr/>
+        </p:nvGrpSpPr>
+        <p:grpSpPr>
+          <a:xfrm>
+            <a:off x="5802886" y="404664"/>
+            <a:ext cx="1361401" cy="1683562"/>
+            <a:chOff x="5544108" y="322941"/>
+            <a:chExt cx="1620180" cy="2277967"/>
+          </a:xfrm>
+        </p:grpSpPr>
+        <p:sp>
+          <p:nvSpPr>
+            <p:cNvPr id="60" name="Freeform 59"/>
+            <p:cNvSpPr/>
+            <p:nvPr/>
+          </p:nvSpPr>
+          <p:spPr>
+            <a:xfrm>
+              <a:off x="5762361" y="549561"/>
+              <a:ext cx="1183674" cy="1598999"/>
+            </a:xfrm>
+            <a:custGeom>
+              <a:avLst/>
+              <a:gdLst>
+                <a:gd name="connsiteX0" fmla="*/ 589031 w 1183674"/>
+                <a:gd name="connsiteY0" fmla="*/ 201 h 1598999"/>
+                <a:gd name="connsiteX1" fmla="*/ 252442 w 1183674"/>
+                <a:gd name="connsiteY1" fmla="*/ 106787 h 1598999"/>
+                <a:gd name="connsiteX2" fmla="*/ 0 w 1183674"/>
+                <a:gd name="connsiteY2" fmla="*/ 594841 h 1598999"/>
+                <a:gd name="connsiteX3" fmla="*/ 252442 w 1183674"/>
+                <a:gd name="connsiteY3" fmla="*/ 1077286 h 1598999"/>
+                <a:gd name="connsiteX4" fmla="*/ 325369 w 1183674"/>
+                <a:gd name="connsiteY4" fmla="*/ 1441924 h 1598999"/>
+                <a:gd name="connsiteX5" fmla="*/ 325369 w 1183674"/>
+                <a:gd name="connsiteY5" fmla="*/ 1598999 h 1598999"/>
+                <a:gd name="connsiteX6" fmla="*/ 863912 w 1183674"/>
+                <a:gd name="connsiteY6" fmla="*/ 1598999 h 1598999"/>
+                <a:gd name="connsiteX7" fmla="*/ 863912 w 1183674"/>
+                <a:gd name="connsiteY7" fmla="*/ 1441924 h 1598999"/>
+                <a:gd name="connsiteX8" fmla="*/ 936839 w 1183674"/>
+                <a:gd name="connsiteY8" fmla="*/ 1077286 h 1598999"/>
+                <a:gd name="connsiteX9" fmla="*/ 1183671 w 1183674"/>
+                <a:gd name="connsiteY9" fmla="*/ 594841 h 1598999"/>
+                <a:gd name="connsiteX10" fmla="*/ 931229 w 1183674"/>
+                <a:gd name="connsiteY10" fmla="*/ 118007 h 1598999"/>
+                <a:gd name="connsiteX11" fmla="*/ 589031 w 1183674"/>
+                <a:gd name="connsiteY11" fmla="*/ 201 h 1598999"/>
+              </a:gdLst>
+              <a:ahLst/>
+              <a:cxnLst>
+                <a:cxn ang="0">
+                  <a:pos x="connsiteX0" y="connsiteY0"/>
+                </a:cxn>
+                <a:cxn ang="0">
+                  <a:pos x="connsiteX1" y="connsiteY1"/>
+                </a:cxn>
+                <a:cxn ang="0">
+                  <a:pos x="connsiteX2" y="connsiteY2"/>
+                </a:cxn>
+                <a:cxn ang="0">
+                  <a:pos x="connsiteX3" y="connsiteY3"/>
+                </a:cxn>
+                <a:cxn ang="0">
+                  <a:pos x="connsiteX4" y="connsiteY4"/>
+                </a:cxn>
+                <a:cxn ang="0">
+                  <a:pos x="connsiteX5" y="connsiteY5"/>
+                </a:cxn>
+                <a:cxn ang="0">
+                  <a:pos x="connsiteX6" y="connsiteY6"/>
+                </a:cxn>
+                <a:cxn ang="0">
+                  <a:pos x="connsiteX7" y="connsiteY7"/>
+                </a:cxn>
+                <a:cxn ang="0">
+                  <a:pos x="connsiteX8" y="connsiteY8"/>
+                </a:cxn>
+                <a:cxn ang="0">
+                  <a:pos x="connsiteX9" y="connsiteY9"/>
+                </a:cxn>
+                <a:cxn ang="0">
+                  <a:pos x="connsiteX10" y="connsiteY10"/>
+                </a:cxn>
+                <a:cxn ang="0">
+                  <a:pos x="connsiteX11" y="connsiteY11"/>
+                </a:cxn>
+              </a:cxnLst>
+              <a:rect l="l" t="t" r="r" b="b"/>
+              <a:pathLst>
+                <a:path w="1183674" h="1598999">
+                  <a:moveTo>
+                    <a:pt x="589031" y="201"/>
+                  </a:moveTo>
+                  <a:cubicBezTo>
+                    <a:pt x="475900" y="-1669"/>
+                    <a:pt x="350614" y="7680"/>
+                    <a:pt x="252442" y="106787"/>
+                  </a:cubicBezTo>
+                  <a:cubicBezTo>
+                    <a:pt x="154270" y="205894"/>
+                    <a:pt x="0" y="433091"/>
+                    <a:pt x="0" y="594841"/>
+                  </a:cubicBezTo>
+                  <a:cubicBezTo>
+                    <a:pt x="0" y="756591"/>
+                    <a:pt x="198214" y="936106"/>
+                    <a:pt x="252442" y="1077286"/>
+                  </a:cubicBezTo>
+                  <a:cubicBezTo>
+                    <a:pt x="306670" y="1218466"/>
+                    <a:pt x="313215" y="1354972"/>
+                    <a:pt x="325369" y="1441924"/>
+                  </a:cubicBezTo>
+                  <a:cubicBezTo>
+                    <a:pt x="337523" y="1528876"/>
+                    <a:pt x="235612" y="1572820"/>
+                    <a:pt x="325369" y="1598999"/>
+                  </a:cubicBezTo>
+                  <a:cubicBezTo>
+                    <a:pt x="415126" y="1625178"/>
+                    <a:pt x="774155" y="1625178"/>
+                    <a:pt x="863912" y="1598999"/>
+                  </a:cubicBezTo>
+                  <a:cubicBezTo>
+                    <a:pt x="953669" y="1572820"/>
+                    <a:pt x="851758" y="1528876"/>
+                    <a:pt x="863912" y="1441924"/>
+                  </a:cubicBezTo>
+                  <a:cubicBezTo>
+                    <a:pt x="876066" y="1354972"/>
+                    <a:pt x="883546" y="1218467"/>
+                    <a:pt x="936839" y="1077286"/>
+                  </a:cubicBezTo>
+                  <a:cubicBezTo>
+                    <a:pt x="990132" y="936106"/>
+                    <a:pt x="1184606" y="754721"/>
+                    <a:pt x="1183671" y="594841"/>
+                  </a:cubicBezTo>
+                  <a:cubicBezTo>
+                    <a:pt x="1182736" y="434961"/>
+                    <a:pt x="1029401" y="217114"/>
+                    <a:pt x="931229" y="118007"/>
+                  </a:cubicBezTo>
+                  <a:cubicBezTo>
+                    <a:pt x="833057" y="18900"/>
+                    <a:pt x="702162" y="2071"/>
+                    <a:pt x="589031" y="201"/>
+                  </a:cubicBezTo>
+                  <a:close/>
+                </a:path>
+              </a:pathLst>
+            </a:custGeom>
+            <a:gradFill flip="none" rotWithShape="1">
+              <a:gsLst>
+                <a:gs pos="0">
+                  <a:srgbClr val="FFFB61"/>
+                </a:gs>
+                <a:gs pos="45000">
+                  <a:srgbClr val="FFFF00"/>
+                </a:gs>
+                <a:gs pos="100000">
+                  <a:srgbClr val="F2750F"/>
+                </a:gs>
+              </a:gsLst>
+              <a:path path="circle">
+                <a:fillToRect l="50000" t="50000" r="50000" b="50000"/>
+              </a:path>
+              <a:tileRect/>
+            </a:gradFill>
+            <a:ln>
+              <a:noFill/>
+            </a:ln>
+          </p:spPr>
+          <p:style>
+            <a:lnRef idx="0">
+              <a:schemeClr val="accent6"/>
+            </a:lnRef>
+            <a:fillRef idx="3">
+              <a:schemeClr val="accent6"/>
+            </a:fillRef>
+            <a:effectRef idx="3">
+              <a:schemeClr val="accent6"/>
+            </a:effectRef>
+            <a:fontRef idx="minor">
+              <a:schemeClr val="lt1"/>
+            </a:fontRef>
+          </p:style>
+          <p:txBody>
+            <a:bodyPr rtlCol="0" anchor="ctr"/>
+            <a:lstStyle/>
+            <a:p>
+              <a:pPr algn="ctr"/>
+              <a:endParaRPr lang="en-IN" sz="2000" b="1">
+                <a:solidFill>
+                  <a:srgbClr val="FFD13F"/>
+                </a:solidFill>
+              </a:endParaRPr>
+            </a:p>
+          </p:txBody>
+        </p:sp>
+        <p:sp>
+          <p:nvSpPr>
+            <p:cNvPr id="39" name="Oval 38"/>
+            <p:cNvSpPr/>
+            <p:nvPr/>
+          </p:nvSpPr>
+          <p:spPr>
+            <a:xfrm>
+              <a:off x="6192180" y="2276872"/>
+              <a:ext cx="324036" cy="324036"/>
+            </a:xfrm>
+            <a:prstGeom prst="ellipse">
+              <a:avLst/>
+            </a:prstGeom>
+            <a:solidFill>
+              <a:schemeClr val="bg1">
+                <a:lumMod val="65000"/>
+              </a:schemeClr>
+            </a:solidFill>
+            <a:ln/>
+          </p:spPr>
+          <p:style>
+            <a:lnRef idx="0">
+              <a:schemeClr val="accent6"/>
+            </a:lnRef>
+            <a:fillRef idx="3">
+              <a:schemeClr val="accent6"/>
+            </a:fillRef>
+            <a:effectRef idx="3">
+              <a:schemeClr val="accent6"/>
+            </a:effectRef>
+            <a:fontRef idx="minor">
+              <a:schemeClr val="lt1"/>
+            </a:fontRef>
+          </p:style>
+          <p:txBody>
+            <a:bodyPr rtlCol="0" anchor="ctr"/>
+            <a:lstStyle/>
+            <a:p>
+              <a:pPr algn="ctr"/>
+              <a:endParaRPr lang="en-IN" sz="2000" b="1" dirty="0">
+                <a:solidFill>
+                  <a:srgbClr val="FFD13F"/>
+                </a:solidFill>
+              </a:endParaRPr>
+            </a:p>
+          </p:txBody>
+        </p:sp>
+        <p:sp>
+          <p:nvSpPr>
+            <p:cNvPr id="41" name="Rounded Rectangle 40"/>
+            <p:cNvSpPr/>
+            <p:nvPr/>
+          </p:nvSpPr>
+          <p:spPr>
+            <a:xfrm>
+              <a:off x="6030162" y="2024844"/>
+              <a:ext cx="648072" cy="216024"/>
+            </a:xfrm>
+            <a:prstGeom prst="roundRect">
+              <a:avLst>
+                <a:gd name="adj" fmla="val 40483"/>
+              </a:avLst>
+            </a:prstGeom>
+            <a:solidFill>
+              <a:schemeClr val="bg1">
+                <a:lumMod val="65000"/>
+              </a:schemeClr>
+            </a:solidFill>
+            <a:ln/>
+          </p:spPr>
+          <p:style>
+            <a:lnRef idx="0">
+              <a:schemeClr val="accent6"/>
+            </a:lnRef>
+            <a:fillRef idx="3">
+              <a:schemeClr val="accent6"/>
+            </a:fillRef>
+            <a:effectRef idx="3">
+              <a:schemeClr val="accent6"/>
+            </a:effectRef>
+            <a:fontRef idx="minor">
+              <a:schemeClr val="lt1"/>
+            </a:fontRef>
+          </p:style>
+          <p:txBody>
+            <a:bodyPr rtlCol="0" anchor="ctr"/>
+            <a:lstStyle/>
+            <a:p>
+              <a:pPr algn="ctr"/>
+              <a:endParaRPr lang="en-IN" sz="2000" b="1">
+                <a:solidFill>
+                  <a:srgbClr val="FFD13F"/>
+                </a:solidFill>
+              </a:endParaRPr>
+            </a:p>
+          </p:txBody>
+        </p:sp>
+        <p:sp>
+          <p:nvSpPr>
+            <p:cNvPr id="42" name="Rounded Rectangle 41"/>
+            <p:cNvSpPr/>
+            <p:nvPr/>
+          </p:nvSpPr>
+          <p:spPr>
+            <a:xfrm>
+              <a:off x="6030162" y="2240868"/>
+              <a:ext cx="648072" cy="216024"/>
+            </a:xfrm>
+            <a:prstGeom prst="roundRect">
+              <a:avLst>
+                <a:gd name="adj" fmla="val 40483"/>
+              </a:avLst>
+            </a:prstGeom>
+            <a:solidFill>
+              <a:schemeClr val="bg1">
+                <a:lumMod val="65000"/>
+              </a:schemeClr>
+            </a:solidFill>
+            <a:ln/>
+          </p:spPr>
+          <p:style>
+            <a:lnRef idx="0">
+              <a:schemeClr val="accent6"/>
+            </a:lnRef>
+            <a:fillRef idx="3">
+              <a:schemeClr val="accent6"/>
+            </a:fillRef>
+            <a:effectRef idx="3">
+              <a:schemeClr val="accent6"/>
+            </a:effectRef>
+            <a:fontRef idx="minor">
+              <a:schemeClr val="lt1"/>
+            </a:fontRef>
+          </p:style>
+          <p:txBody>
+            <a:bodyPr rtlCol="0" anchor="ctr"/>
+            <a:lstStyle/>
+            <a:p>
+              <a:pPr algn="ctr"/>
+              <a:endParaRPr lang="en-IN" sz="2000" b="1">
+                <a:solidFill>
+                  <a:srgbClr val="FFD13F"/>
+                </a:solidFill>
+              </a:endParaRPr>
+            </a:p>
+          </p:txBody>
+        </p:sp>
+        <p:sp>
+          <p:nvSpPr>
+            <p:cNvPr id="71" name="Rectangle 70"/>
+            <p:cNvSpPr/>
+            <p:nvPr/>
+          </p:nvSpPr>
+          <p:spPr>
+            <a:xfrm>
+              <a:off x="6894258" y="682981"/>
+              <a:ext cx="270030" cy="45719"/>
+            </a:xfrm>
+            <a:prstGeom prst="rect">
+              <a:avLst/>
+            </a:prstGeom>
+            <a:solidFill>
+              <a:srgbClr val="F4EE00"/>
+            </a:solidFill>
+            <a:ln>
+              <a:noFill/>
+            </a:ln>
+            <a:scene3d>
+              <a:camera prst="orthographicFront">
+                <a:rot lat="0" lon="0" rev="1800000"/>
+              </a:camera>
+              <a:lightRig rig="threePt" dir="t">
+                <a:rot lat="0" lon="0" rev="1200000"/>
+              </a:lightRig>
+            </a:scene3d>
+            <a:sp3d>
+              <a:bevelT w="63500" h="25400"/>
+            </a:sp3d>
+          </p:spPr>
+          <p:style>
+            <a:lnRef idx="0">
+              <a:schemeClr val="accent6"/>
+            </a:lnRef>
+            <a:fillRef idx="3">
+              <a:schemeClr val="accent6"/>
+            </a:fillRef>
+            <a:effectRef idx="3">
+              <a:schemeClr val="accent6"/>
+            </a:effectRef>
+            <a:fontRef idx="minor">
+              <a:schemeClr val="lt1"/>
+            </a:fontRef>
+          </p:style>
+          <p:txBody>
+            <a:bodyPr rtlCol="0" anchor="ctr"/>
+            <a:lstStyle/>
+            <a:p>
+              <a:pPr algn="ctr"/>
+              <a:endParaRPr lang="en-IN" sz="2000" b="1">
+                <a:solidFill>
+                  <a:srgbClr val="FFD13F"/>
+                </a:solidFill>
+              </a:endParaRPr>
+            </a:p>
+          </p:txBody>
+        </p:sp>
+        <p:sp>
+          <p:nvSpPr>
+            <p:cNvPr id="75" name="Rectangle 74"/>
+            <p:cNvSpPr/>
+            <p:nvPr/>
+          </p:nvSpPr>
+          <p:spPr>
+            <a:xfrm>
+              <a:off x="6588224" y="322941"/>
+              <a:ext cx="270030" cy="45719"/>
+            </a:xfrm>
+            <a:prstGeom prst="rect">
+              <a:avLst/>
+            </a:prstGeom>
+            <a:solidFill>
+              <a:srgbClr val="F4EE00"/>
+            </a:solidFill>
+            <a:ln>
+              <a:noFill/>
+            </a:ln>
+            <a:scene3d>
+              <a:camera prst="orthographicFront">
+                <a:rot lat="0" lon="0" rev="3600000"/>
+              </a:camera>
+              <a:lightRig rig="threePt" dir="t">
+                <a:rot lat="0" lon="0" rev="1200000"/>
+              </a:lightRig>
+            </a:scene3d>
+            <a:sp3d>
+              <a:bevelT w="63500" h="25400"/>
+            </a:sp3d>
+          </p:spPr>
+          <p:style>
+            <a:lnRef idx="0">
+              <a:schemeClr val="accent6"/>
+            </a:lnRef>
+            <a:fillRef idx="3">
+              <a:schemeClr val="accent6"/>
+            </a:fillRef>
+            <a:effectRef idx="3">
+              <a:schemeClr val="accent6"/>
+            </a:effectRef>
+            <a:fontRef idx="minor">
+              <a:schemeClr val="lt1"/>
+            </a:fontRef>
+          </p:style>
+          <p:txBody>
+            <a:bodyPr rtlCol="0" anchor="ctr"/>
+            <a:lstStyle/>
+            <a:p>
+              <a:pPr algn="ctr"/>
+              <a:endParaRPr lang="en-IN" sz="2000" b="1">
+                <a:solidFill>
+                  <a:srgbClr val="FFD13F"/>
+                </a:solidFill>
+              </a:endParaRPr>
+            </a:p>
+          </p:txBody>
+        </p:sp>
+        <p:sp>
+          <p:nvSpPr>
+            <p:cNvPr id="76" name="Rectangle 75"/>
+            <p:cNvSpPr/>
+            <p:nvPr/>
+          </p:nvSpPr>
+          <p:spPr>
+            <a:xfrm>
+              <a:off x="5850142" y="322941"/>
+              <a:ext cx="270030" cy="45719"/>
+            </a:xfrm>
+            <a:prstGeom prst="rect">
+              <a:avLst/>
+            </a:prstGeom>
+            <a:solidFill>
+              <a:srgbClr val="F4EE00"/>
+            </a:solidFill>
+            <a:ln>
+              <a:noFill/>
+            </a:ln>
+            <a:scene3d>
+              <a:camera prst="orthographicFront">
+                <a:rot lat="0" lon="0" rev="7200000"/>
+              </a:camera>
+              <a:lightRig rig="threePt" dir="t">
+                <a:rot lat="0" lon="0" rev="1200000"/>
+              </a:lightRig>
+            </a:scene3d>
+            <a:sp3d>
+              <a:bevelT w="63500" h="25400"/>
+            </a:sp3d>
+          </p:spPr>
+          <p:style>
+            <a:lnRef idx="0">
+              <a:schemeClr val="accent6"/>
+            </a:lnRef>
+            <a:fillRef idx="3">
+              <a:schemeClr val="accent6"/>
+            </a:fillRef>
+            <a:effectRef idx="3">
+              <a:schemeClr val="accent6"/>
+            </a:effectRef>
+            <a:fontRef idx="minor">
+              <a:schemeClr val="lt1"/>
+            </a:fontRef>
+          </p:style>
+          <p:txBody>
+            <a:bodyPr rtlCol="0" anchor="ctr"/>
+            <a:lstStyle/>
+            <a:p>
+              <a:pPr algn="ctr"/>
+              <a:endParaRPr lang="en-IN" sz="2000" b="1">
+                <a:solidFill>
+                  <a:srgbClr val="FFD13F"/>
+                </a:solidFill>
+              </a:endParaRPr>
+            </a:p>
+          </p:txBody>
+        </p:sp>
+        <p:sp>
+          <p:nvSpPr>
+            <p:cNvPr id="77" name="Rectangle 76"/>
+            <p:cNvSpPr/>
+            <p:nvPr/>
+          </p:nvSpPr>
+          <p:spPr>
+            <a:xfrm>
+              <a:off x="5544108" y="682981"/>
+              <a:ext cx="270030" cy="45719"/>
+            </a:xfrm>
+            <a:prstGeom prst="rect">
+              <a:avLst/>
+            </a:prstGeom>
+            <a:solidFill>
+              <a:srgbClr val="F4EE00"/>
+            </a:solidFill>
+            <a:ln>
+              <a:noFill/>
+            </a:ln>
+            <a:scene3d>
+              <a:camera prst="orthographicFront">
+                <a:rot lat="0" lon="0" rev="9000000"/>
+              </a:camera>
+              <a:lightRig rig="threePt" dir="t">
+                <a:rot lat="0" lon="0" rev="1200000"/>
+              </a:lightRig>
+            </a:scene3d>
+            <a:sp3d>
+              <a:bevelT w="63500" h="25400"/>
+            </a:sp3d>
+          </p:spPr>
+          <p:style>
+            <a:lnRef idx="0">
+              <a:schemeClr val="accent6"/>
+            </a:lnRef>
+            <a:fillRef idx="3">
+              <a:schemeClr val="accent6"/>
+            </a:fillRef>
+            <a:effectRef idx="3">
+              <a:schemeClr val="accent6"/>
+            </a:effectRef>
+            <a:fontRef idx="minor">
+              <a:schemeClr val="lt1"/>
+            </a:fontRef>
+          </p:style>
+          <p:txBody>
+            <a:bodyPr rtlCol="0" anchor="ctr"/>
+            <a:lstStyle/>
+            <a:p>
+              <a:pPr algn="ctr"/>
+              <a:endParaRPr lang="en-IN" sz="2000" b="1">
+                <a:solidFill>
+                  <a:srgbClr val="FFD13F"/>
+                </a:solidFill>
+              </a:endParaRPr>
+            </a:p>
+          </p:txBody>
+        </p:sp>
+      </p:grpSp>
+      <p:grpSp>
+        <p:nvGrpSpPr>
+          <p:cNvPr id="90" name="Group 89"/>
+          <p:cNvGrpSpPr/>
+          <p:nvPr/>
+        </p:nvGrpSpPr>
+        <p:grpSpPr>
+          <a:xfrm>
+            <a:off x="755636" y="1282132"/>
+            <a:ext cx="884831" cy="778716"/>
+            <a:chOff x="755636" y="1282132"/>
+            <a:chExt cx="884831" cy="778716"/>
+          </a:xfrm>
+        </p:grpSpPr>
+        <p:grpSp>
+          <p:nvGrpSpPr>
+            <p:cNvPr id="78" name="Group 77"/>
+            <p:cNvGrpSpPr/>
+            <p:nvPr/>
+          </p:nvGrpSpPr>
+          <p:grpSpPr>
+            <a:xfrm>
+              <a:off x="1100467" y="1282132"/>
+              <a:ext cx="540000" cy="668947"/>
+              <a:chOff x="1100467" y="1282132"/>
+              <a:chExt cx="540000" cy="668947"/>
+            </a:xfrm>
+            <a:scene3d>
+              <a:camera prst="perspectiveLeft"/>
+              <a:lightRig rig="threePt" dir="t"/>
+            </a:scene3d>
+          </p:grpSpPr>
+          <p:sp>
+            <p:nvSpPr>
+              <p:cNvPr id="80" name="Rounded Rectangle 79"/>
+              <p:cNvSpPr/>
+              <p:nvPr/>
+            </p:nvSpPr>
+            <p:spPr>
+              <a:xfrm>
+                <a:off x="1100467" y="1282132"/>
+                <a:ext cx="540000" cy="668947"/>
+              </a:xfrm>
+              <a:prstGeom prst="roundRect">
+                <a:avLst>
+                  <a:gd name="adj" fmla="val 10434"/>
+                </a:avLst>
+              </a:prstGeom>
+              <a:solidFill>
+                <a:schemeClr val="accent6">
+                  <a:lumMod val="75000"/>
+                </a:schemeClr>
+              </a:solidFill>
+              <a:ln>
+                <a:noFill/>
+              </a:ln>
+            </p:spPr>
+            <p:style>
+              <a:lnRef idx="0">
+                <a:schemeClr val="accent6"/>
+              </a:lnRef>
+              <a:fillRef idx="3">
+                <a:schemeClr val="accent6"/>
+              </a:fillRef>
+              <a:effectRef idx="3">
+                <a:schemeClr val="accent6"/>
+              </a:effectRef>
+              <a:fontRef idx="minor">
+                <a:schemeClr val="lt1"/>
+              </a:fontRef>
+            </p:style>
+            <p:txBody>
+              <a:bodyPr rtlCol="0" anchor="ctr"/>
+              <a:lstStyle/>
+              <a:p>
+                <a:pPr algn="ctr"/>
+                <a:endParaRPr lang="en-IN"/>
+              </a:p>
+            </p:txBody>
+          </p:sp>
+          <p:sp>
+            <p:nvSpPr>
+              <p:cNvPr id="81" name="Rounded Rectangle 80"/>
+              <p:cNvSpPr/>
+              <p:nvPr/>
+            </p:nvSpPr>
+            <p:spPr>
+              <a:xfrm>
+                <a:off x="1136467" y="1317805"/>
+                <a:ext cx="468000" cy="597600"/>
+              </a:xfrm>
+              <a:prstGeom prst="roundRect">
+                <a:avLst>
+                  <a:gd name="adj" fmla="val 4441"/>
+                </a:avLst>
+              </a:prstGeom>
+              <a:solidFill>
+                <a:schemeClr val="bg1"/>
+              </a:solidFill>
+              <a:ln>
+                <a:noFill/>
+              </a:ln>
+              <a:sp3d/>
+            </p:spPr>
+            <p:style>
+              <a:lnRef idx="0">
+                <a:schemeClr val="accent6"/>
+              </a:lnRef>
+              <a:fillRef idx="3">
+                <a:schemeClr val="accent6"/>
+              </a:fillRef>
+              <a:effectRef idx="3">
+                <a:schemeClr val="accent6"/>
+              </a:effectRef>
+              <a:fontRef idx="minor">
+                <a:schemeClr val="lt1"/>
+              </a:fontRef>
+            </p:style>
+            <p:txBody>
+              <a:bodyPr rtlCol="0" anchor="ctr"/>
+              <a:lstStyle/>
+              <a:p>
+                <a:pPr algn="ctr"/>
+                <a:r>
+                  <a:rPr lang="en-US" sz="400" b="1" dirty="0" smtClean="0">
+                    <a:solidFill>
+                      <a:schemeClr val="tx1"/>
+                    </a:solidFill>
+                  </a:rPr>
+                  <a:t>----------------------------------------------------------------------------------------------------------------------------------------</a:t>
+                </a:r>
+              </a:p>
+            </p:txBody>
+          </p:sp>
+        </p:grpSp>
+        <p:grpSp>
+          <p:nvGrpSpPr>
+            <p:cNvPr id="84" name="Group 83"/>
+            <p:cNvGrpSpPr/>
+            <p:nvPr/>
+          </p:nvGrpSpPr>
+          <p:grpSpPr>
+            <a:xfrm>
+              <a:off x="928051" y="1337016"/>
+              <a:ext cx="540000" cy="668947"/>
+              <a:chOff x="1100467" y="1282132"/>
+              <a:chExt cx="540000" cy="668947"/>
+            </a:xfrm>
+            <a:scene3d>
+              <a:camera prst="perspectiveLeft"/>
+              <a:lightRig rig="threePt" dir="t"/>
+            </a:scene3d>
+          </p:grpSpPr>
+          <p:sp>
+            <p:nvSpPr>
+              <p:cNvPr id="85" name="Rounded Rectangle 84"/>
+              <p:cNvSpPr/>
+              <p:nvPr/>
+            </p:nvSpPr>
+            <p:spPr>
+              <a:xfrm>
+                <a:off x="1100467" y="1282132"/>
+                <a:ext cx="540000" cy="668947"/>
+              </a:xfrm>
+              <a:prstGeom prst="roundRect">
+                <a:avLst>
+                  <a:gd name="adj" fmla="val 10434"/>
+                </a:avLst>
+              </a:prstGeom>
+              <a:solidFill>
+                <a:schemeClr val="accent6">
+                  <a:lumMod val="75000"/>
+                </a:schemeClr>
+              </a:solidFill>
+              <a:ln>
+                <a:noFill/>
+              </a:ln>
+            </p:spPr>
+            <p:style>
+              <a:lnRef idx="0">
+                <a:schemeClr val="accent6"/>
+              </a:lnRef>
+              <a:fillRef idx="3">
+                <a:schemeClr val="accent6"/>
+              </a:fillRef>
+              <a:effectRef idx="3">
+                <a:schemeClr val="accent6"/>
+              </a:effectRef>
+              <a:fontRef idx="minor">
+                <a:schemeClr val="lt1"/>
+              </a:fontRef>
+            </p:style>
+            <p:txBody>
+              <a:bodyPr rtlCol="0" anchor="ctr"/>
+              <a:lstStyle/>
+              <a:p>
+                <a:pPr algn="ctr"/>
+                <a:endParaRPr lang="en-IN"/>
+              </a:p>
+            </p:txBody>
+          </p:sp>
+          <p:sp>
+            <p:nvSpPr>
+              <p:cNvPr id="86" name="Rounded Rectangle 85"/>
+              <p:cNvSpPr/>
+              <p:nvPr/>
+            </p:nvSpPr>
+            <p:spPr>
+              <a:xfrm>
+                <a:off x="1136467" y="1317805"/>
+                <a:ext cx="468000" cy="597600"/>
+              </a:xfrm>
+              <a:prstGeom prst="roundRect">
+                <a:avLst>
+                  <a:gd name="adj" fmla="val 4441"/>
+                </a:avLst>
+              </a:prstGeom>
+              <a:solidFill>
+                <a:schemeClr val="bg1"/>
+              </a:solidFill>
+              <a:ln>
+                <a:noFill/>
+              </a:ln>
+              <a:sp3d/>
+            </p:spPr>
+            <p:style>
+              <a:lnRef idx="0">
+                <a:schemeClr val="accent6"/>
+              </a:lnRef>
+              <a:fillRef idx="3">
+                <a:schemeClr val="accent6"/>
+              </a:fillRef>
+              <a:effectRef idx="3">
+                <a:schemeClr val="accent6"/>
+              </a:effectRef>
+              <a:fontRef idx="minor">
+                <a:schemeClr val="lt1"/>
+              </a:fontRef>
+            </p:style>
+            <p:txBody>
+              <a:bodyPr rtlCol="0" anchor="ctr"/>
+              <a:lstStyle/>
+              <a:p>
+                <a:pPr algn="ctr"/>
+                <a:r>
+                  <a:rPr lang="en-US" sz="400" b="1" dirty="0" smtClean="0">
+                    <a:solidFill>
+                      <a:schemeClr val="tx1"/>
+                    </a:solidFill>
+                  </a:rPr>
+                  <a:t>----------------------------------------------------------------------------------------------------------------------------------------</a:t>
+                </a:r>
+              </a:p>
+            </p:txBody>
+          </p:sp>
+        </p:grpSp>
+        <p:grpSp>
+          <p:nvGrpSpPr>
+            <p:cNvPr id="87" name="Group 86"/>
+            <p:cNvGrpSpPr/>
+            <p:nvPr/>
+          </p:nvGrpSpPr>
+          <p:grpSpPr>
+            <a:xfrm>
+              <a:off x="755636" y="1391901"/>
+              <a:ext cx="540000" cy="668947"/>
+              <a:chOff x="1100467" y="1282132"/>
+              <a:chExt cx="540000" cy="668947"/>
+            </a:xfrm>
+            <a:scene3d>
+              <a:camera prst="perspectiveLeft"/>
+              <a:lightRig rig="threePt" dir="t"/>
+            </a:scene3d>
+          </p:grpSpPr>
+          <p:sp>
+            <p:nvSpPr>
+              <p:cNvPr id="88" name="Rounded Rectangle 87"/>
+              <p:cNvSpPr/>
+              <p:nvPr/>
+            </p:nvSpPr>
+            <p:spPr>
+              <a:xfrm>
+                <a:off x="1100467" y="1282132"/>
+                <a:ext cx="540000" cy="668947"/>
+              </a:xfrm>
+              <a:prstGeom prst="roundRect">
+                <a:avLst>
+                  <a:gd name="adj" fmla="val 10434"/>
+                </a:avLst>
+              </a:prstGeom>
+              <a:solidFill>
+                <a:schemeClr val="accent6">
+                  <a:lumMod val="75000"/>
+                </a:schemeClr>
+              </a:solidFill>
+              <a:ln>
+                <a:noFill/>
+              </a:ln>
+            </p:spPr>
+            <p:style>
+              <a:lnRef idx="0">
+                <a:schemeClr val="accent6"/>
+              </a:lnRef>
+              <a:fillRef idx="3">
+                <a:schemeClr val="accent6"/>
+              </a:fillRef>
+              <a:effectRef idx="3">
+                <a:schemeClr val="accent6"/>
+              </a:effectRef>
+              <a:fontRef idx="minor">
+                <a:schemeClr val="lt1"/>
+              </a:fontRef>
+            </p:style>
+            <p:txBody>
+              <a:bodyPr rtlCol="0" anchor="ctr"/>
+              <a:lstStyle/>
+              <a:p>
+                <a:pPr algn="ctr"/>
+                <a:endParaRPr lang="en-IN"/>
+              </a:p>
+            </p:txBody>
+          </p:sp>
+          <p:sp>
+            <p:nvSpPr>
+              <p:cNvPr id="89" name="Rounded Rectangle 88"/>
+              <p:cNvSpPr/>
+              <p:nvPr/>
+            </p:nvSpPr>
+            <p:spPr>
+              <a:xfrm>
+                <a:off x="1136467" y="1317805"/>
+                <a:ext cx="468000" cy="597600"/>
+              </a:xfrm>
+              <a:prstGeom prst="roundRect">
+                <a:avLst>
+                  <a:gd name="adj" fmla="val 4441"/>
+                </a:avLst>
+              </a:prstGeom>
+              <a:solidFill>
+                <a:schemeClr val="bg1"/>
+              </a:solidFill>
+              <a:ln>
+                <a:noFill/>
+              </a:ln>
+              <a:sp3d/>
+            </p:spPr>
+            <p:style>
+              <a:lnRef idx="0">
+                <a:schemeClr val="accent6"/>
+              </a:lnRef>
+              <a:fillRef idx="3">
+                <a:schemeClr val="accent6"/>
+              </a:fillRef>
+              <a:effectRef idx="3">
+                <a:schemeClr val="accent6"/>
+              </a:effectRef>
+              <a:fontRef idx="minor">
+                <a:schemeClr val="lt1"/>
+              </a:fontRef>
+            </p:style>
+            <p:txBody>
+              <a:bodyPr rtlCol="0" anchor="ctr"/>
+              <a:lstStyle/>
+              <a:p>
+                <a:pPr algn="ctr"/>
+                <a:r>
+                  <a:rPr lang="en-US" sz="400" b="1" dirty="0" smtClean="0">
+                    <a:solidFill>
+                      <a:schemeClr val="tx1"/>
+                    </a:solidFill>
+                  </a:rPr>
+                  <a:t>----------------------------------------------------------------------------------------------------------------------------------------</a:t>
+                </a:r>
+              </a:p>
+            </p:txBody>
+          </p:sp>
+        </p:grpSp>
+      </p:grpSp>
+      <p:grpSp>
+        <p:nvGrpSpPr>
+          <p:cNvPr id="103" name="Group 102"/>
+          <p:cNvGrpSpPr/>
+          <p:nvPr/>
+        </p:nvGrpSpPr>
+        <p:grpSpPr>
+          <a:xfrm>
+            <a:off x="1727744" y="1985385"/>
+            <a:ext cx="540000" cy="723535"/>
+            <a:chOff x="1727744" y="1985385"/>
+            <a:chExt cx="540000" cy="723535"/>
+          </a:xfrm>
+        </p:grpSpPr>
+        <p:grpSp>
+          <p:nvGrpSpPr>
+            <p:cNvPr id="95" name="Group 94"/>
+            <p:cNvGrpSpPr/>
+            <p:nvPr/>
+          </p:nvGrpSpPr>
+          <p:grpSpPr>
+            <a:xfrm>
+              <a:off x="1727744" y="2039973"/>
+              <a:ext cx="540000" cy="668947"/>
+              <a:chOff x="1100467" y="1282132"/>
+              <a:chExt cx="540000" cy="668947"/>
+            </a:xfrm>
+            <a:scene3d>
+              <a:camera prst="perspectiveLeft"/>
+              <a:lightRig rig="threePt" dir="t"/>
+            </a:scene3d>
+          </p:grpSpPr>
+          <p:sp>
+            <p:nvSpPr>
+              <p:cNvPr id="96" name="Rounded Rectangle 95"/>
+              <p:cNvSpPr/>
+              <p:nvPr/>
+            </p:nvSpPr>
+            <p:spPr>
+              <a:xfrm>
+                <a:off x="1100467" y="1282132"/>
+                <a:ext cx="540000" cy="668947"/>
+              </a:xfrm>
+              <a:prstGeom prst="roundRect">
+                <a:avLst>
+                  <a:gd name="adj" fmla="val 10434"/>
+                </a:avLst>
+              </a:prstGeom>
+              <a:solidFill>
+                <a:schemeClr val="accent6">
+                  <a:lumMod val="75000"/>
+                </a:schemeClr>
+              </a:solidFill>
+              <a:ln>
+                <a:noFill/>
+              </a:ln>
+            </p:spPr>
+            <p:style>
+              <a:lnRef idx="0">
+                <a:schemeClr val="accent6"/>
+              </a:lnRef>
+              <a:fillRef idx="3">
+                <a:schemeClr val="accent6"/>
+              </a:fillRef>
+              <a:effectRef idx="3">
+                <a:schemeClr val="accent6"/>
+              </a:effectRef>
+              <a:fontRef idx="minor">
+                <a:schemeClr val="lt1"/>
+              </a:fontRef>
+            </p:style>
+            <p:txBody>
+              <a:bodyPr rtlCol="0" anchor="ctr"/>
+              <a:lstStyle/>
+              <a:p>
+                <a:pPr algn="ctr"/>
+                <a:endParaRPr lang="en-IN"/>
+              </a:p>
+            </p:txBody>
+          </p:sp>
+          <p:sp>
+            <p:nvSpPr>
+              <p:cNvPr id="97" name="Rounded Rectangle 96"/>
+              <p:cNvSpPr/>
+              <p:nvPr/>
+            </p:nvSpPr>
+            <p:spPr>
+              <a:xfrm>
+                <a:off x="1136467" y="1317805"/>
+                <a:ext cx="468000" cy="597600"/>
+              </a:xfrm>
+              <a:prstGeom prst="roundRect">
+                <a:avLst>
+                  <a:gd name="adj" fmla="val 4441"/>
+                </a:avLst>
+              </a:prstGeom>
+              <a:solidFill>
+                <a:schemeClr val="bg1"/>
+              </a:solidFill>
+              <a:ln>
+                <a:noFill/>
+              </a:ln>
+              <a:sp3d/>
+            </p:spPr>
+            <p:style>
+              <a:lnRef idx="0">
+                <a:schemeClr val="accent6"/>
+              </a:lnRef>
+              <a:fillRef idx="3">
+                <a:schemeClr val="accent6"/>
+              </a:fillRef>
+              <a:effectRef idx="3">
+                <a:schemeClr val="accent6"/>
+              </a:effectRef>
+              <a:fontRef idx="minor">
+                <a:schemeClr val="lt1"/>
+              </a:fontRef>
+            </p:style>
+            <p:txBody>
+              <a:bodyPr rtlCol="0" anchor="ctr"/>
+              <a:lstStyle/>
+              <a:p>
+                <a:pPr algn="ctr"/>
+                <a:r>
+                  <a:rPr lang="en-US" sz="400" b="1" dirty="0" smtClean="0">
+                    <a:solidFill>
+                      <a:schemeClr val="tx1"/>
+                    </a:solidFill>
+                  </a:rPr>
+                  <a:t>----------------------------------------------------------------------------------------------------------------------------------------</a:t>
+                </a:r>
+              </a:p>
+            </p:txBody>
+          </p:sp>
+        </p:grpSp>
+        <p:sp>
+          <p:nvSpPr>
+            <p:cNvPr id="91" name="Rectangle 90"/>
+            <p:cNvSpPr/>
+            <p:nvPr/>
+          </p:nvSpPr>
+          <p:spPr>
+            <a:xfrm>
+              <a:off x="1794368" y="2042598"/>
+              <a:ext cx="406753" cy="64559"/>
+            </a:xfrm>
+            <a:prstGeom prst="rect">
+              <a:avLst/>
+            </a:prstGeom>
+            <a:solidFill>
+              <a:schemeClr val="tx1">
+                <a:lumMod val="50000"/>
+                <a:lumOff val="50000"/>
+              </a:schemeClr>
+            </a:solidFill>
+            <a:ln>
+              <a:noFill/>
+            </a:ln>
+          </p:spPr>
+          <p:style>
+            <a:lnRef idx="0">
+              <a:schemeClr val="accent6"/>
+            </a:lnRef>
+            <a:fillRef idx="3">
+              <a:schemeClr val="accent6"/>
+            </a:fillRef>
+            <a:effectRef idx="3">
+              <a:schemeClr val="accent6"/>
+            </a:effectRef>
+            <a:fontRef idx="minor">
+              <a:schemeClr val="lt1"/>
+            </a:fontRef>
+          </p:style>
+          <p:txBody>
+            <a:bodyPr rtlCol="0" anchor="ctr"/>
+            <a:lstStyle/>
+            <a:p>
+              <a:pPr algn="ctr"/>
+              <a:endParaRPr lang="en-IN"/>
+            </a:p>
+          </p:txBody>
+        </p:sp>
+        <p:sp>
+          <p:nvSpPr>
+            <p:cNvPr id="102" name="Oval 101"/>
+            <p:cNvSpPr/>
+            <p:nvPr/>
+          </p:nvSpPr>
+          <p:spPr>
+            <a:xfrm>
+              <a:off x="1943738" y="1985385"/>
+              <a:ext cx="108012" cy="71967"/>
+            </a:xfrm>
+            <a:prstGeom prst="ellipse">
+              <a:avLst/>
+            </a:prstGeom>
+            <a:solidFill>
+              <a:schemeClr val="tx1">
+                <a:lumMod val="50000"/>
+                <a:lumOff val="50000"/>
+              </a:schemeClr>
+            </a:solidFill>
+            <a:ln>
+              <a:noFill/>
+            </a:ln>
+          </p:spPr>
+          <p:style>
+            <a:lnRef idx="0">
+              <a:schemeClr val="accent6"/>
+            </a:lnRef>
+            <a:fillRef idx="3">
+              <a:schemeClr val="accent6"/>
+            </a:fillRef>
+            <a:effectRef idx="3">
+              <a:schemeClr val="accent6"/>
+            </a:effectRef>
+            <a:fontRef idx="minor">
+              <a:schemeClr val="lt1"/>
+            </a:fontRef>
+          </p:style>
+          <p:txBody>
+            <a:bodyPr rtlCol="0" anchor="ctr"/>
+            <a:lstStyle/>
+            <a:p>
+              <a:pPr algn="ctr"/>
+              <a:endParaRPr lang="en-IN"/>
+            </a:p>
+          </p:txBody>
+        </p:sp>
+        <p:sp>
+          <p:nvSpPr>
+            <p:cNvPr id="104" name="Oval 103"/>
+            <p:cNvSpPr/>
+            <p:nvPr/>
+          </p:nvSpPr>
+          <p:spPr>
+            <a:xfrm>
+              <a:off x="2012817" y="2096852"/>
+              <a:ext cx="215964" cy="180020"/>
+            </a:xfrm>
+            <a:prstGeom prst="ellipse">
+              <a:avLst/>
+            </a:prstGeom>
+            <a:noFill/>
+            <a:ln/>
+            <a:scene3d>
+              <a:camera prst="isometricOffAxis1Right"/>
+              <a:lightRig rig="threePt" dir="t">
+                <a:rot lat="0" lon="0" rev="1200000"/>
+              </a:lightRig>
+            </a:scene3d>
+            <a:sp3d>
+              <a:bevelT w="63500" h="25400"/>
+            </a:sp3d>
+          </p:spPr>
+          <p:style>
+            <a:lnRef idx="0">
+              <a:schemeClr val="accent6"/>
+            </a:lnRef>
+            <a:fillRef idx="3">
+              <a:schemeClr val="accent6"/>
+            </a:fillRef>
+            <a:effectRef idx="3">
+              <a:schemeClr val="accent6"/>
+            </a:effectRef>
+            <a:fontRef idx="minor">
+              <a:schemeClr val="lt1"/>
+            </a:fontRef>
+          </p:style>
+          <p:txBody>
+            <a:bodyPr rtlCol="0" anchor="ctr">
+              <a:sp3d extrusionH="57150">
+                <a:bevelT w="38100" h="38100"/>
+              </a:sp3d>
+            </a:bodyPr>
+            <a:lstStyle/>
+            <a:p>
+              <a:pPr algn="ctr"/>
+              <a:r>
+                <a:rPr lang="en-US" sz="1200" b="1" dirty="0">
+                  <a:ln>
+                    <a:solidFill>
+                      <a:srgbClr val="009600"/>
+                    </a:solidFill>
+                  </a:ln>
+                  <a:solidFill>
+                    <a:srgbClr val="009600"/>
+                  </a:solidFill>
+                  <a:latin typeface="Cooper Black" panose="0208090404030B020404" pitchFamily="18" charset="0"/>
+                  <a:sym typeface="Wingdings"/>
+                </a:rPr>
+                <a:t></a:t>
+              </a:r>
+              <a:endParaRPr lang="en-IN" sz="1200" b="1" dirty="0">
+                <a:ln>
+                  <a:solidFill>
+                    <a:srgbClr val="009600"/>
+                  </a:solidFill>
+                </a:ln>
+                <a:solidFill>
+                  <a:srgbClr val="009600"/>
+                </a:solidFill>
+                <a:latin typeface="Cooper Black" panose="0208090404030B020404" pitchFamily="18" charset="0"/>
+              </a:endParaRPr>
+            </a:p>
+          </p:txBody>
+        </p:sp>
+        <p:sp>
+          <p:nvSpPr>
+            <p:cNvPr id="105" name="Oval 104"/>
+            <p:cNvSpPr/>
+            <p:nvPr/>
+          </p:nvSpPr>
+          <p:spPr>
+            <a:xfrm>
+              <a:off x="2015776" y="2204864"/>
+              <a:ext cx="215964" cy="180020"/>
+            </a:xfrm>
+            <a:prstGeom prst="ellipse">
+              <a:avLst/>
+            </a:prstGeom>
+            <a:noFill/>
+            <a:ln/>
+            <a:scene3d>
+              <a:camera prst="isometricOffAxis1Right"/>
+              <a:lightRig rig="threePt" dir="t">
+                <a:rot lat="0" lon="0" rev="1200000"/>
+              </a:lightRig>
+            </a:scene3d>
+            <a:sp3d>
+              <a:bevelT w="63500" h="25400"/>
+            </a:sp3d>
+          </p:spPr>
+          <p:style>
+            <a:lnRef idx="0">
+              <a:schemeClr val="accent6"/>
+            </a:lnRef>
+            <a:fillRef idx="3">
+              <a:schemeClr val="accent6"/>
+            </a:fillRef>
+            <a:effectRef idx="3">
+              <a:schemeClr val="accent6"/>
+            </a:effectRef>
+            <a:fontRef idx="minor">
+              <a:schemeClr val="lt1"/>
+            </a:fontRef>
+          </p:style>
+          <p:txBody>
+            <a:bodyPr rtlCol="0" anchor="ctr">
+              <a:sp3d extrusionH="57150">
+                <a:bevelT w="38100" h="38100"/>
+              </a:sp3d>
+            </a:bodyPr>
+            <a:lstStyle/>
+            <a:p>
+              <a:pPr algn="ctr"/>
+              <a:r>
+                <a:rPr lang="en-US" sz="1200" b="1" dirty="0">
+                  <a:ln>
+                    <a:solidFill>
+                      <a:srgbClr val="009600"/>
+                    </a:solidFill>
+                  </a:ln>
+                  <a:solidFill>
+                    <a:srgbClr val="009600"/>
+                  </a:solidFill>
+                  <a:latin typeface="Cooper Black" panose="0208090404030B020404" pitchFamily="18" charset="0"/>
+                  <a:sym typeface="Wingdings"/>
+                </a:rPr>
+                <a:t></a:t>
+              </a:r>
+              <a:endParaRPr lang="en-IN" sz="1200" b="1" dirty="0">
+                <a:ln>
+                  <a:solidFill>
+                    <a:srgbClr val="009600"/>
+                  </a:solidFill>
+                </a:ln>
+                <a:solidFill>
+                  <a:srgbClr val="009600"/>
+                </a:solidFill>
+                <a:latin typeface="Cooper Black" panose="0208090404030B020404" pitchFamily="18" charset="0"/>
+              </a:endParaRPr>
+            </a:p>
+          </p:txBody>
+        </p:sp>
+        <p:sp>
+          <p:nvSpPr>
+            <p:cNvPr id="106" name="Oval 105"/>
+            <p:cNvSpPr/>
+            <p:nvPr/>
+          </p:nvSpPr>
+          <p:spPr>
+            <a:xfrm>
+              <a:off x="2015716" y="2312876"/>
+              <a:ext cx="215964" cy="180020"/>
+            </a:xfrm>
+            <a:prstGeom prst="ellipse">
+              <a:avLst/>
+            </a:prstGeom>
+            <a:noFill/>
+            <a:ln/>
+            <a:scene3d>
+              <a:camera prst="isometricOffAxis1Right"/>
+              <a:lightRig rig="threePt" dir="t">
+                <a:rot lat="0" lon="0" rev="1200000"/>
+              </a:lightRig>
+            </a:scene3d>
+            <a:sp3d>
+              <a:bevelT w="63500" h="25400"/>
+            </a:sp3d>
+          </p:spPr>
+          <p:style>
+            <a:lnRef idx="0">
+              <a:schemeClr val="accent6"/>
+            </a:lnRef>
+            <a:fillRef idx="3">
+              <a:schemeClr val="accent6"/>
+            </a:fillRef>
+            <a:effectRef idx="3">
+              <a:schemeClr val="accent6"/>
+            </a:effectRef>
+            <a:fontRef idx="minor">
+              <a:schemeClr val="lt1"/>
+            </a:fontRef>
+          </p:style>
+          <p:txBody>
+            <a:bodyPr rtlCol="0" anchor="ctr">
+              <a:sp3d extrusionH="57150">
+                <a:bevelT w="38100" h="38100"/>
+              </a:sp3d>
+            </a:bodyPr>
+            <a:lstStyle/>
+            <a:p>
+              <a:pPr algn="ctr"/>
+              <a:r>
+                <a:rPr lang="en-US" sz="1200" b="1" dirty="0">
+                  <a:ln>
+                    <a:solidFill>
+                      <a:srgbClr val="009600"/>
+                    </a:solidFill>
+                  </a:ln>
+                  <a:solidFill>
+                    <a:srgbClr val="009600"/>
+                  </a:solidFill>
+                  <a:latin typeface="Cooper Black" panose="0208090404030B020404" pitchFamily="18" charset="0"/>
+                  <a:sym typeface="Wingdings"/>
+                </a:rPr>
+                <a:t></a:t>
+              </a:r>
+              <a:endParaRPr lang="en-IN" sz="1200" b="1" dirty="0">
+                <a:ln>
+                  <a:solidFill>
+                    <a:srgbClr val="009600"/>
+                  </a:solidFill>
+                </a:ln>
+                <a:solidFill>
+                  <a:srgbClr val="009600"/>
+                </a:solidFill>
+                <a:latin typeface="Cooper Black" panose="0208090404030B020404" pitchFamily="18" charset="0"/>
+              </a:endParaRPr>
+            </a:p>
+          </p:txBody>
+        </p:sp>
+      </p:grpSp>
+      <p:sp>
+        <p:nvSpPr>
+          <p:cNvPr id="57" name="Oval 56"/>
+          <p:cNvSpPr/>
+          <p:nvPr/>
+        </p:nvSpPr>
+        <p:spPr>
+          <a:xfrm>
+            <a:off x="4422914" y="3032956"/>
+            <a:ext cx="761154" cy="684076"/>
+          </a:xfrm>
+          <a:prstGeom prst="ellipse">
+            <a:avLst/>
+          </a:prstGeom>
+          <a:noFill/>
+          <a:ln/>
+          <a:scene3d>
+            <a:camera prst="orthographicFront"/>
+            <a:lightRig rig="threePt" dir="t">
+              <a:rot lat="0" lon="0" rev="1200000"/>
+            </a:lightRig>
+          </a:scene3d>
+          <a:sp3d>
+            <a:bevelT w="63500" h="25400"/>
+          </a:sp3d>
+        </p:spPr>
+        <p:style>
+          <a:lnRef idx="0">
+            <a:schemeClr val="accent6"/>
+          </a:lnRef>
+          <a:fillRef idx="3">
+            <a:schemeClr val="accent6"/>
+          </a:fillRef>
+          <a:effectRef idx="3">
+            <a:schemeClr val="accent6"/>
+          </a:effectRef>
+          <a:fontRef idx="minor">
+            <a:schemeClr val="lt1"/>
+          </a:fontRef>
+        </p:style>
+        <p:txBody>
+          <a:bodyPr rtlCol="0" anchor="ctr">
+            <a:sp3d/>
+          </a:bodyPr>
+          <a:lstStyle/>
+          <a:p>
+            <a:pPr algn="ctr"/>
+            <a:r>
+              <a:rPr lang="en-US" sz="6000" b="1" dirty="0">
+                <a:ln>
+                  <a:solidFill>
+                    <a:schemeClr val="bg2"/>
+                  </a:solidFill>
+                </a:ln>
+                <a:solidFill>
+                  <a:schemeClr val="tx1"/>
+                </a:solidFill>
+                <a:latin typeface="Cooper Black" panose="0208090404030B020404" pitchFamily="18" charset="0"/>
+                <a:sym typeface="Webdings"/>
+              </a:rPr>
+              <a:t></a:t>
+            </a:r>
+            <a:endParaRPr lang="en-IN" sz="6000" b="1" dirty="0">
+              <a:ln>
+                <a:solidFill>
+                  <a:schemeClr val="bg2"/>
+                </a:solidFill>
+              </a:ln>
+              <a:solidFill>
+                <a:schemeClr val="tx1"/>
+              </a:solidFill>
+              <a:latin typeface="Cooper Black" panose="0208090404030B020404" pitchFamily="18" charset="0"/>
+            </a:endParaRPr>
+          </a:p>
+        </p:txBody>
+      </p:sp>
+      <p:sp>
+        <p:nvSpPr>
+          <p:cNvPr id="56" name="Oval 55"/>
+          <p:cNvSpPr/>
+          <p:nvPr/>
+        </p:nvSpPr>
+        <p:spPr>
+          <a:xfrm>
+            <a:off x="2879812" y="3861048"/>
+            <a:ext cx="761154" cy="684076"/>
+          </a:xfrm>
+          <a:prstGeom prst="ellipse">
+            <a:avLst/>
+          </a:prstGeom>
+          <a:noFill/>
+          <a:ln/>
+          <a:scene3d>
+            <a:camera prst="isometricOffAxis1Right"/>
+            <a:lightRig rig="threePt" dir="t">
+              <a:rot lat="0" lon="0" rev="1200000"/>
+            </a:lightRig>
+          </a:scene3d>
+          <a:sp3d>
+            <a:bevelT w="63500" h="25400"/>
+          </a:sp3d>
+        </p:spPr>
+        <p:style>
+          <a:lnRef idx="0">
+            <a:schemeClr val="accent6"/>
+          </a:lnRef>
+          <a:fillRef idx="3">
+            <a:schemeClr val="accent6"/>
+          </a:fillRef>
+          <a:effectRef idx="3">
+            <a:schemeClr val="accent6"/>
+          </a:effectRef>
+          <a:fontRef idx="minor">
+            <a:schemeClr val="lt1"/>
+          </a:fontRef>
+        </p:style>
+        <p:txBody>
+          <a:bodyPr rtlCol="0" anchor="ctr">
+            <a:sp3d extrusionH="57150">
+              <a:bevelT w="38100" h="38100"/>
+            </a:sp3d>
+          </a:bodyPr>
+          <a:lstStyle/>
+          <a:p>
+            <a:pPr algn="ctr"/>
+            <a:r>
+              <a:rPr lang="en-US" sz="2000" b="1" dirty="0">
+                <a:ln>
+                  <a:solidFill>
+                    <a:srgbClr val="F4EE00"/>
+                  </a:solidFill>
+                </a:ln>
+                <a:solidFill>
+                  <a:srgbClr val="FFC000"/>
+                </a:solidFill>
+                <a:latin typeface="Cooper Black" panose="0208090404030B020404" pitchFamily="18" charset="0"/>
+              </a:rPr>
+              <a:t>T</a:t>
+            </a:r>
+            <a:endParaRPr lang="en-IN" sz="2000" b="1" dirty="0">
+              <a:ln>
+                <a:solidFill>
+                  <a:srgbClr val="F4EE00"/>
+                </a:solidFill>
+              </a:ln>
+              <a:solidFill>
+                <a:srgbClr val="FFC000"/>
+              </a:solidFill>
+              <a:latin typeface="Cooper Black" panose="0208090404030B020404" pitchFamily="18" charset="0"/>
+            </a:endParaRPr>
+          </a:p>
+        </p:txBody>
+      </p:sp>
+      <p:sp>
+        <p:nvSpPr>
+          <p:cNvPr id="55" name="Oval 54"/>
+          <p:cNvSpPr/>
+          <p:nvPr/>
+        </p:nvSpPr>
+        <p:spPr>
+          <a:xfrm>
+            <a:off x="3107886" y="2564904"/>
+            <a:ext cx="852046" cy="846094"/>
+          </a:xfrm>
+          <a:prstGeom prst="ellipse">
+            <a:avLst/>
+          </a:prstGeom>
+          <a:noFill/>
+          <a:ln/>
+          <a:scene3d>
+            <a:camera prst="isometricOffAxis1Right">
+              <a:rot lat="600000" lon="19200000" rev="1200000"/>
+            </a:camera>
+            <a:lightRig rig="threePt" dir="t">
+              <a:rot lat="0" lon="0" rev="1200000"/>
+            </a:lightRig>
+          </a:scene3d>
+          <a:sp3d>
+            <a:bevelT w="63500" h="25400"/>
+          </a:sp3d>
+        </p:spPr>
+        <p:style>
+          <a:lnRef idx="0">
+            <a:schemeClr val="accent6"/>
+          </a:lnRef>
+          <a:fillRef idx="3">
+            <a:schemeClr val="accent6"/>
+          </a:fillRef>
+          <a:effectRef idx="3">
+            <a:schemeClr val="accent6"/>
+          </a:effectRef>
+          <a:fontRef idx="minor">
+            <a:schemeClr val="lt1"/>
+          </a:fontRef>
+        </p:style>
+        <p:txBody>
+          <a:bodyPr rtlCol="0" anchor="ctr">
+            <a:sp3d extrusionH="57150">
+              <a:bevelT w="38100" h="38100"/>
+            </a:sp3d>
+          </a:bodyPr>
+          <a:lstStyle/>
+          <a:p>
+            <a:pPr algn="ctr"/>
+            <a:r>
+              <a:rPr lang="en-US" sz="6000" b="1" dirty="0" smtClean="0">
+                <a:ln>
+                  <a:solidFill>
+                    <a:srgbClr val="F4EE00"/>
+                  </a:solidFill>
+                </a:ln>
+                <a:solidFill>
+                  <a:srgbClr val="FFC000"/>
+                </a:solidFill>
+                <a:latin typeface="Cooper Black" panose="0208090404030B020404" pitchFamily="18" charset="0"/>
+              </a:rPr>
+              <a:t>Q</a:t>
+            </a:r>
+            <a:endParaRPr lang="en-IN" sz="6000" b="1" dirty="0">
+              <a:ln>
+                <a:solidFill>
+                  <a:srgbClr val="F4EE00"/>
+                </a:solidFill>
+              </a:ln>
+              <a:solidFill>
+                <a:srgbClr val="FFC000"/>
+              </a:solidFill>
+              <a:latin typeface="Cooper Black" panose="0208090404030B020404" pitchFamily="18" charset="0"/>
+            </a:endParaRPr>
+          </a:p>
+        </p:txBody>
+      </p:sp>
     </p:spTree>
     <p:extLst>
       <p:ext uri="{BB962C8B-B14F-4D97-AF65-F5344CB8AC3E}">

</xml_diff>

<commit_message>
skeliton implementation of Rating and observation module
</commit_message>
<xml_diff>
--- a/www/static/nittio_res_v39/_icon_sources/icons.pptx
+++ b/www/static/nittio_res_v39/_icon_sources/icons.pptx
@@ -289,7 +289,7 @@
           <a:p>
             <a:fld id="{745A7134-949B-428F-9A82-7D09DE304FD2}" type="datetimeFigureOut">
               <a:rPr lang="en-IN" smtClean="0"/>
-              <a:t>29-10-2015</a:t>
+              <a:t>10-11-2015</a:t>
             </a:fld>
             <a:endParaRPr lang="en-IN"/>
           </a:p>
@@ -459,7 +459,7 @@
           <a:p>
             <a:fld id="{745A7134-949B-428F-9A82-7D09DE304FD2}" type="datetimeFigureOut">
               <a:rPr lang="en-IN" smtClean="0"/>
-              <a:t>29-10-2015</a:t>
+              <a:t>10-11-2015</a:t>
             </a:fld>
             <a:endParaRPr lang="en-IN"/>
           </a:p>
@@ -639,7 +639,7 @@
           <a:p>
             <a:fld id="{745A7134-949B-428F-9A82-7D09DE304FD2}" type="datetimeFigureOut">
               <a:rPr lang="en-IN" smtClean="0"/>
-              <a:t>29-10-2015</a:t>
+              <a:t>10-11-2015</a:t>
             </a:fld>
             <a:endParaRPr lang="en-IN"/>
           </a:p>
@@ -809,7 +809,7 @@
           <a:p>
             <a:fld id="{745A7134-949B-428F-9A82-7D09DE304FD2}" type="datetimeFigureOut">
               <a:rPr lang="en-IN" smtClean="0"/>
-              <a:t>29-10-2015</a:t>
+              <a:t>10-11-2015</a:t>
             </a:fld>
             <a:endParaRPr lang="en-IN"/>
           </a:p>
@@ -1055,7 +1055,7 @@
           <a:p>
             <a:fld id="{745A7134-949B-428F-9A82-7D09DE304FD2}" type="datetimeFigureOut">
               <a:rPr lang="en-IN" smtClean="0"/>
-              <a:t>29-10-2015</a:t>
+              <a:t>10-11-2015</a:t>
             </a:fld>
             <a:endParaRPr lang="en-IN"/>
           </a:p>
@@ -1343,7 +1343,7 @@
           <a:p>
             <a:fld id="{745A7134-949B-428F-9A82-7D09DE304FD2}" type="datetimeFigureOut">
               <a:rPr lang="en-IN" smtClean="0"/>
-              <a:t>29-10-2015</a:t>
+              <a:t>10-11-2015</a:t>
             </a:fld>
             <a:endParaRPr lang="en-IN"/>
           </a:p>
@@ -1765,7 +1765,7 @@
           <a:p>
             <a:fld id="{745A7134-949B-428F-9A82-7D09DE304FD2}" type="datetimeFigureOut">
               <a:rPr lang="en-IN" smtClean="0"/>
-              <a:t>29-10-2015</a:t>
+              <a:t>10-11-2015</a:t>
             </a:fld>
             <a:endParaRPr lang="en-IN"/>
           </a:p>
@@ -1883,7 +1883,7 @@
           <a:p>
             <a:fld id="{745A7134-949B-428F-9A82-7D09DE304FD2}" type="datetimeFigureOut">
               <a:rPr lang="en-IN" smtClean="0"/>
-              <a:t>29-10-2015</a:t>
+              <a:t>10-11-2015</a:t>
             </a:fld>
             <a:endParaRPr lang="en-IN"/>
           </a:p>
@@ -1978,7 +1978,7 @@
           <a:p>
             <a:fld id="{745A7134-949B-428F-9A82-7D09DE304FD2}" type="datetimeFigureOut">
               <a:rPr lang="en-IN" smtClean="0"/>
-              <a:t>29-10-2015</a:t>
+              <a:t>10-11-2015</a:t>
             </a:fld>
             <a:endParaRPr lang="en-IN"/>
           </a:p>
@@ -2255,7 +2255,7 @@
           <a:p>
             <a:fld id="{745A7134-949B-428F-9A82-7D09DE304FD2}" type="datetimeFigureOut">
               <a:rPr lang="en-IN" smtClean="0"/>
-              <a:t>29-10-2015</a:t>
+              <a:t>10-11-2015</a:t>
             </a:fld>
             <a:endParaRPr lang="en-IN"/>
           </a:p>
@@ -2508,7 +2508,7 @@
           <a:p>
             <a:fld id="{745A7134-949B-428F-9A82-7D09DE304FD2}" type="datetimeFigureOut">
               <a:rPr lang="en-IN" smtClean="0"/>
-              <a:t>29-10-2015</a:t>
+              <a:t>10-11-2015</a:t>
             </a:fld>
             <a:endParaRPr lang="en-IN"/>
           </a:p>
@@ -2721,7 +2721,7 @@
           <a:p>
             <a:fld id="{745A7134-949B-428F-9A82-7D09DE304FD2}" type="datetimeFigureOut">
               <a:rPr lang="en-IN" smtClean="0"/>
-              <a:t>29-10-2015</a:t>
+              <a:t>10-11-2015</a:t>
             </a:fld>
             <a:endParaRPr lang="en-IN"/>
           </a:p>
@@ -3678,16 +3678,7 @@
                 </a:solidFill>
                 <a:sym typeface="Wingdings"/>
               </a:rPr>
-              <a:t> Q ? ! &gt; &amp; $ # </a:t>
-            </a:r>
-            <a:r>
-              <a:rPr lang="en-US" dirty="0" smtClean="0">
-                <a:solidFill>
-                  <a:schemeClr val="tx1"/>
-                </a:solidFill>
-                <a:sym typeface="Wingdings"/>
-              </a:rPr>
-              <a:t></a:t>
+              <a:t> Q ? ! &gt; &amp; $ # </a:t>
             </a:r>
             <a:r>
               <a:rPr lang="en-US" dirty="0" smtClean="0">
@@ -12633,6 +12624,275 @@
           </a:p>
         </p:txBody>
       </p:sp>
+      <p:grpSp>
+        <p:nvGrpSpPr>
+          <p:cNvPr id="58" name="Group 57"/>
+          <p:cNvGrpSpPr/>
+          <p:nvPr/>
+        </p:nvGrpSpPr>
+        <p:grpSpPr>
+          <a:xfrm>
+            <a:off x="6166532" y="2394114"/>
+            <a:ext cx="2606845" cy="2585831"/>
+            <a:chOff x="794995" y="1131200"/>
+            <a:chExt cx="2606845" cy="2585831"/>
+          </a:xfrm>
+        </p:grpSpPr>
+        <p:pic>
+          <p:nvPicPr>
+            <p:cNvPr id="59" name="Picture 2"/>
+            <p:cNvPicPr>
+              <a:picLocks noChangeAspect="1" noChangeArrowheads="1"/>
+            </p:cNvPicPr>
+            <p:nvPr/>
+          </p:nvPicPr>
+          <p:blipFill rotWithShape="1">
+            <a:blip r:embed="rId3">
+              <a:extLst>
+                <a:ext uri="{28A0092B-C50C-407E-A947-70E740481C1C}">
+                  <a14:useLocalDpi xmlns:a14="http://schemas.microsoft.com/office/drawing/2010/main" val="0"/>
+                </a:ext>
+              </a:extLst>
+            </a:blip>
+            <a:srcRect l="18545" t="3179" r="25800" b="2992"/>
+            <a:stretch/>
+          </p:blipFill>
+          <p:spPr bwMode="auto">
+            <a:xfrm>
+              <a:off x="850208" y="1131200"/>
+              <a:ext cx="2551632" cy="2585831"/>
+            </a:xfrm>
+            <a:prstGeom prst="rect">
+              <a:avLst/>
+            </a:prstGeom>
+            <a:noFill/>
+            <a:ln>
+              <a:noFill/>
+            </a:ln>
+            <a:effectLst/>
+            <a:extLst>
+              <a:ext uri="{909E8E84-426E-40DD-AFC4-6F175D3DCCD1}">
+                <a14:hiddenFill xmlns:a14="http://schemas.microsoft.com/office/drawing/2010/main">
+                  <a:solidFill>
+                    <a:schemeClr val="accent1"/>
+                  </a:solidFill>
+                </a14:hiddenFill>
+              </a:ext>
+              <a:ext uri="{91240B29-F687-4F45-9708-019B960494DF}">
+                <a14:hiddenLine xmlns:a14="http://schemas.microsoft.com/office/drawing/2010/main" w="9525">
+                  <a:solidFill>
+                    <a:schemeClr val="tx1"/>
+                  </a:solidFill>
+                  <a:miter lim="800000"/>
+                  <a:headEnd/>
+                  <a:tailEnd/>
+                </a14:hiddenLine>
+              </a:ext>
+              <a:ext uri="{AF507438-7753-43E0-B8FC-AC1667EBCBE1}">
+                <a14:hiddenEffects xmlns:a14="http://schemas.microsoft.com/office/drawing/2010/main">
+                  <a:effectLst>
+                    <a:outerShdw dist="35921" dir="2700000" algn="ctr" rotWithShape="0">
+                      <a:schemeClr val="bg2"/>
+                    </a:outerShdw>
+                  </a:effectLst>
+                </a14:hiddenEffects>
+              </a:ext>
+            </a:extLst>
+          </p:spPr>
+        </p:pic>
+        <p:sp>
+          <p:nvSpPr>
+            <p:cNvPr id="61" name="Oval 60"/>
+            <p:cNvSpPr/>
+            <p:nvPr/>
+          </p:nvSpPr>
+          <p:spPr>
+            <a:xfrm>
+              <a:off x="1789988" y="2092677"/>
+              <a:ext cx="672072" cy="662877"/>
+            </a:xfrm>
+            <a:prstGeom prst="ellipse">
+              <a:avLst/>
+            </a:prstGeom>
+            <a:solidFill>
+              <a:schemeClr val="accent5">
+                <a:lumMod val="75000"/>
+              </a:schemeClr>
+            </a:solidFill>
+            <a:ln/>
+          </p:spPr>
+          <p:style>
+            <a:lnRef idx="0">
+              <a:schemeClr val="accent6"/>
+            </a:lnRef>
+            <a:fillRef idx="3">
+              <a:schemeClr val="accent6"/>
+            </a:fillRef>
+            <a:effectRef idx="3">
+              <a:schemeClr val="accent6"/>
+            </a:effectRef>
+            <a:fontRef idx="minor">
+              <a:schemeClr val="lt1"/>
+            </a:fontRef>
+          </p:style>
+          <p:txBody>
+            <a:bodyPr rtlCol="0" anchor="ctr"/>
+            <a:lstStyle/>
+            <a:p>
+              <a:pPr algn="ctr"/>
+              <a:endParaRPr lang="en-IN" sz="2000" b="1" dirty="0">
+                <a:solidFill>
+                  <a:srgbClr val="FFD13F"/>
+                </a:solidFill>
+              </a:endParaRPr>
+            </a:p>
+          </p:txBody>
+        </p:sp>
+        <p:sp>
+          <p:nvSpPr>
+            <p:cNvPr id="62" name="Right Arrow 61"/>
+            <p:cNvSpPr/>
+            <p:nvPr/>
+          </p:nvSpPr>
+          <p:spPr>
+            <a:xfrm rot="19200000">
+              <a:off x="2253733" y="1780649"/>
+              <a:ext cx="1019124" cy="237775"/>
+            </a:xfrm>
+            <a:prstGeom prst="rightArrow">
+              <a:avLst/>
+            </a:prstGeom>
+            <a:solidFill>
+              <a:schemeClr val="accent5">
+                <a:lumMod val="75000"/>
+              </a:schemeClr>
+            </a:solidFill>
+            <a:ln/>
+          </p:spPr>
+          <p:style>
+            <a:lnRef idx="0">
+              <a:schemeClr val="accent6"/>
+            </a:lnRef>
+            <a:fillRef idx="3">
+              <a:schemeClr val="accent6"/>
+            </a:fillRef>
+            <a:effectRef idx="3">
+              <a:schemeClr val="accent6"/>
+            </a:effectRef>
+            <a:fontRef idx="minor">
+              <a:schemeClr val="lt1"/>
+            </a:fontRef>
+          </p:style>
+          <p:txBody>
+            <a:bodyPr rtlCol="0" anchor="ctr"/>
+            <a:lstStyle/>
+            <a:p>
+              <a:pPr algn="ctr"/>
+              <a:endParaRPr lang="en-IN" sz="2000" b="1">
+                <a:solidFill>
+                  <a:srgbClr val="FFD13F"/>
+                </a:solidFill>
+              </a:endParaRPr>
+            </a:p>
+          </p:txBody>
+        </p:sp>
+        <p:sp>
+          <p:nvSpPr>
+            <p:cNvPr id="63" name="Right Arrow 62"/>
+            <p:cNvSpPr/>
+            <p:nvPr/>
+          </p:nvSpPr>
+          <p:spPr>
+            <a:xfrm rot="3780000">
+              <a:off x="1968927" y="3038173"/>
+              <a:ext cx="1019124" cy="237775"/>
+            </a:xfrm>
+            <a:prstGeom prst="rightArrow">
+              <a:avLst/>
+            </a:prstGeom>
+            <a:solidFill>
+              <a:schemeClr val="accent5">
+                <a:lumMod val="75000"/>
+              </a:schemeClr>
+            </a:solidFill>
+            <a:ln/>
+          </p:spPr>
+          <p:style>
+            <a:lnRef idx="0">
+              <a:schemeClr val="accent6"/>
+            </a:lnRef>
+            <a:fillRef idx="3">
+              <a:schemeClr val="accent6"/>
+            </a:fillRef>
+            <a:effectRef idx="3">
+              <a:schemeClr val="accent6"/>
+            </a:effectRef>
+            <a:fontRef idx="minor">
+              <a:schemeClr val="lt1"/>
+            </a:fontRef>
+          </p:style>
+          <p:txBody>
+            <a:bodyPr rtlCol="0" anchor="ctr"/>
+            <a:lstStyle/>
+            <a:p>
+              <a:pPr algn="ctr"/>
+              <a:endParaRPr lang="en-IN" sz="2000" b="1">
+                <a:solidFill>
+                  <a:srgbClr val="FFD13F"/>
+                </a:solidFill>
+              </a:endParaRPr>
+            </a:p>
+          </p:txBody>
+        </p:sp>
+        <p:sp>
+          <p:nvSpPr>
+            <p:cNvPr id="64" name="Right Arrow 63"/>
+            <p:cNvSpPr/>
+            <p:nvPr/>
+          </p:nvSpPr>
+          <p:spPr>
+            <a:xfrm rot="9960000">
+              <a:off x="794995" y="2495418"/>
+              <a:ext cx="1019124" cy="237775"/>
+            </a:xfrm>
+            <a:prstGeom prst="rightArrow">
+              <a:avLst/>
+            </a:prstGeom>
+            <a:solidFill>
+              <a:schemeClr val="accent5">
+                <a:lumMod val="75000"/>
+              </a:schemeClr>
+            </a:solidFill>
+            <a:ln/>
+          </p:spPr>
+          <p:style>
+            <a:lnRef idx="0">
+              <a:schemeClr val="accent6"/>
+            </a:lnRef>
+            <a:fillRef idx="3">
+              <a:schemeClr val="accent6"/>
+            </a:fillRef>
+            <a:effectRef idx="3">
+              <a:schemeClr val="accent6"/>
+            </a:effectRef>
+            <a:fontRef idx="minor">
+              <a:schemeClr val="lt1"/>
+            </a:fontRef>
+          </p:style>
+          <p:txBody>
+            <a:bodyPr rtlCol="0" anchor="ctr"/>
+            <a:lstStyle/>
+            <a:p>
+              <a:pPr algn="ctr"/>
+              <a:endParaRPr lang="en-IN" sz="2000" b="1">
+                <a:solidFill>
+                  <a:srgbClr val="FFD13F"/>
+                </a:solidFill>
+              </a:endParaRPr>
+            </a:p>
+          </p:txBody>
+        </p:sp>
+      </p:grpSp>
     </p:spTree>
     <p:extLst>
       <p:ext uri="{BB962C8B-B14F-4D97-AF65-F5344CB8AC3E}">

</xml_diff>